<commit_message>
DOC: update Pandas Cheat Sheet (GH13202)
closes #14963
</commit_message>
<xml_diff>
--- a/doc/cheatsheet/Pandas_Cheat_Sheet.pptx
+++ b/doc/cheatsheet/Pandas_Cheat_Sheet.pptx
@@ -244,7 +244,7 @@
           <a:p>
             <a:fld id="{79278B33-2949-49BE-B3B0-3F16CAF906FE}" type="datetimeFigureOut">
               <a:rPr lang="en-US" smtClean="0"/>
-              <a:t>12/21/2016</a:t>
+              <a:t>12/22/2016</a:t>
             </a:fld>
             <a:endParaRPr lang="en-US"/>
           </a:p>
@@ -414,7 +414,7 @@
           <a:p>
             <a:fld id="{79278B33-2949-49BE-B3B0-3F16CAF906FE}" type="datetimeFigureOut">
               <a:rPr lang="en-US" smtClean="0"/>
-              <a:t>12/21/2016</a:t>
+              <a:t>12/22/2016</a:t>
             </a:fld>
             <a:endParaRPr lang="en-US"/>
           </a:p>
@@ -594,7 +594,7 @@
           <a:p>
             <a:fld id="{79278B33-2949-49BE-B3B0-3F16CAF906FE}" type="datetimeFigureOut">
               <a:rPr lang="en-US" smtClean="0"/>
-              <a:t>12/21/2016</a:t>
+              <a:t>12/22/2016</a:t>
             </a:fld>
             <a:endParaRPr lang="en-US"/>
           </a:p>
@@ -764,7 +764,7 @@
           <a:p>
             <a:fld id="{79278B33-2949-49BE-B3B0-3F16CAF906FE}" type="datetimeFigureOut">
               <a:rPr lang="en-US" smtClean="0"/>
-              <a:t>12/21/2016</a:t>
+              <a:t>12/22/2016</a:t>
             </a:fld>
             <a:endParaRPr lang="en-US"/>
           </a:p>
@@ -1008,7 +1008,7 @@
           <a:p>
             <a:fld id="{79278B33-2949-49BE-B3B0-3F16CAF906FE}" type="datetimeFigureOut">
               <a:rPr lang="en-US" smtClean="0"/>
-              <a:t>12/21/2016</a:t>
+              <a:t>12/22/2016</a:t>
             </a:fld>
             <a:endParaRPr lang="en-US"/>
           </a:p>
@@ -1240,7 +1240,7 @@
           <a:p>
             <a:fld id="{79278B33-2949-49BE-B3B0-3F16CAF906FE}" type="datetimeFigureOut">
               <a:rPr lang="en-US" smtClean="0"/>
-              <a:t>12/21/2016</a:t>
+              <a:t>12/22/2016</a:t>
             </a:fld>
             <a:endParaRPr lang="en-US"/>
           </a:p>
@@ -1607,7 +1607,7 @@
           <a:p>
             <a:fld id="{79278B33-2949-49BE-B3B0-3F16CAF906FE}" type="datetimeFigureOut">
               <a:rPr lang="en-US" smtClean="0"/>
-              <a:t>12/21/2016</a:t>
+              <a:t>12/22/2016</a:t>
             </a:fld>
             <a:endParaRPr lang="en-US"/>
           </a:p>
@@ -1725,7 +1725,7 @@
           <a:p>
             <a:fld id="{79278B33-2949-49BE-B3B0-3F16CAF906FE}" type="datetimeFigureOut">
               <a:rPr lang="en-US" smtClean="0"/>
-              <a:t>12/21/2016</a:t>
+              <a:t>12/22/2016</a:t>
             </a:fld>
             <a:endParaRPr lang="en-US"/>
           </a:p>
@@ -1820,7 +1820,7 @@
           <a:p>
             <a:fld id="{79278B33-2949-49BE-B3B0-3F16CAF906FE}" type="datetimeFigureOut">
               <a:rPr lang="en-US" smtClean="0"/>
-              <a:t>12/21/2016</a:t>
+              <a:t>12/22/2016</a:t>
             </a:fld>
             <a:endParaRPr lang="en-US"/>
           </a:p>
@@ -2097,7 +2097,7 @@
           <a:p>
             <a:fld id="{79278B33-2949-49BE-B3B0-3F16CAF906FE}" type="datetimeFigureOut">
               <a:rPr lang="en-US" smtClean="0"/>
-              <a:t>12/21/2016</a:t>
+              <a:t>12/22/2016</a:t>
             </a:fld>
             <a:endParaRPr lang="en-US"/>
           </a:p>
@@ -2354,7 +2354,7 @@
           <a:p>
             <a:fld id="{79278B33-2949-49BE-B3B0-3F16CAF906FE}" type="datetimeFigureOut">
               <a:rPr lang="en-US" smtClean="0"/>
-              <a:t>12/21/2016</a:t>
+              <a:t>12/22/2016</a:t>
             </a:fld>
             <a:endParaRPr lang="en-US"/>
           </a:p>
@@ -2567,7 +2567,7 @@
           <a:p>
             <a:fld id="{79278B33-2949-49BE-B3B0-3F16CAF906FE}" type="datetimeFigureOut">
               <a:rPr lang="en-US" smtClean="0"/>
-              <a:t>12/21/2016</a:t>
+              <a:t>12/22/2016</a:t>
             </a:fld>
             <a:endParaRPr lang="en-US"/>
           </a:p>
@@ -12515,8 +12515,8 @@
         </p:nvSpPr>
         <p:spPr>
           <a:xfrm>
-            <a:off x="3958595" y="6980115"/>
-            <a:ext cx="4504529" cy="2308324"/>
+            <a:off x="3958595" y="7063240"/>
+            <a:ext cx="2468370" cy="1938992"/>
           </a:xfrm>
           <a:prstGeom prst="rect">
             <a:avLst/>
@@ -12558,160 +12558,104 @@
             </a:endParaRPr>
           </a:p>
           <a:p>
+            <a:pPr marL="174625"/>
+            <a:r>
+              <a:rPr lang="en-US" sz="1200" dirty="0" smtClean="0"/>
+              <a:t>Extract rows that meet logical criteria.</a:t>
+            </a:r>
+          </a:p>
+          <a:p>
+            <a:r>
+              <a:rPr lang="en-US" sz="1200" b="1" dirty="0" err="1">
+                <a:latin typeface="Consolas" panose="020B0609020204030204" pitchFamily="49" charset="0"/>
+              </a:rPr>
+              <a:t>d</a:t>
+            </a:r>
+            <a:r>
+              <a:rPr lang="en-US" sz="1200" b="1" dirty="0" err="1" smtClean="0">
+                <a:latin typeface="Consolas" panose="020B0609020204030204" pitchFamily="49" charset="0"/>
+              </a:rPr>
+              <a:t>f.drop_duplicates</a:t>
+            </a:r>
+            <a:r>
+              <a:rPr lang="en-US" sz="1200" b="1" dirty="0" smtClean="0">
+                <a:latin typeface="Consolas" panose="020B0609020204030204" pitchFamily="49" charset="0"/>
+              </a:rPr>
+              <a:t>()</a:t>
+            </a:r>
+          </a:p>
+          <a:p>
+            <a:pPr marL="174625"/>
+            <a:r>
+              <a:rPr lang="en-US" sz="1200" dirty="0" smtClean="0"/>
+              <a:t>Remove </a:t>
+            </a:r>
             <a:r>
               <a:rPr lang="en-US" sz="1200" dirty="0"/>
-              <a:t> </a:t>
-            </a:r>
-            <a:r>
-              <a:rPr lang="en-US" sz="1200" dirty="0" smtClean="0"/>
-              <a:t>    Extract rows that meet logical criteria.</a:t>
-            </a:r>
-          </a:p>
-          <a:p>
-            <a:r>
-              <a:rPr lang="en-US" sz="1200" b="1" dirty="0" err="1">
-                <a:latin typeface="Consolas" panose="020B0609020204030204" pitchFamily="49" charset="0"/>
-              </a:rPr>
-              <a:t>d</a:t>
-            </a:r>
+              <a:t>duplicate rows (only considers columns).</a:t>
+            </a:r>
+          </a:p>
+          <a:p>
             <a:r>
               <a:rPr lang="en-US" sz="1200" b="1" dirty="0" err="1" smtClean="0">
                 <a:latin typeface="Consolas" panose="020B0609020204030204" pitchFamily="49" charset="0"/>
               </a:rPr>
-              <a:t>f.drop_duplicates</a:t>
+              <a:t>df.head</a:t>
             </a:r>
             <a:r>
               <a:rPr lang="en-US" sz="1200" b="1" dirty="0" smtClean="0">
                 <a:latin typeface="Consolas" panose="020B0609020204030204" pitchFamily="49" charset="0"/>
               </a:rPr>
-              <a:t>()</a:t>
-            </a:r>
-          </a:p>
-          <a:p>
-            <a:r>
-              <a:rPr lang="en-US" sz="1200" dirty="0"/>
-              <a:t> </a:t>
-            </a:r>
-            <a:r>
-              <a:rPr lang="en-US" sz="1200" dirty="0" smtClean="0"/>
-              <a:t>    Remove duplicate rows (only considers columns).</a:t>
-            </a:r>
-          </a:p>
-          <a:p>
-            <a:r>
-              <a:rPr lang="en-US" sz="1200" b="1" dirty="0" err="1" smtClean="0">
-                <a:latin typeface="Consolas" panose="020B0609020204030204" pitchFamily="49" charset="0"/>
-              </a:rPr>
-              <a:t>df.sample</a:t>
-            </a:r>
-            <a:r>
-              <a:rPr lang="en-US" sz="1200" b="1" dirty="0" smtClean="0">
-                <a:latin typeface="Consolas" panose="020B0609020204030204" pitchFamily="49" charset="0"/>
-              </a:rPr>
-              <a:t>(</a:t>
-            </a:r>
-            <a:r>
-              <a:rPr lang="en-US" sz="1200" b="1" dirty="0" err="1" smtClean="0">
-                <a:latin typeface="Consolas" panose="020B0609020204030204" pitchFamily="49" charset="0"/>
-              </a:rPr>
-              <a:t>frac</a:t>
-            </a:r>
-            <a:r>
-              <a:rPr lang="en-US" sz="1200" b="1" dirty="0" smtClean="0">
-                <a:latin typeface="Consolas" panose="020B0609020204030204" pitchFamily="49" charset="0"/>
-              </a:rPr>
-              <a:t>=0.5)</a:t>
-            </a:r>
-          </a:p>
-          <a:p>
-            <a:r>
-              <a:rPr lang="en-US" sz="1200" dirty="0"/>
-              <a:t> </a:t>
-            </a:r>
-            <a:r>
-              <a:rPr lang="en-US" sz="1200" dirty="0" smtClean="0"/>
-              <a:t>    Randomly select fraction of rows.</a:t>
-            </a:r>
-          </a:p>
-          <a:p>
-            <a:r>
-              <a:rPr lang="en-US" sz="1200" b="1" dirty="0" err="1" smtClean="0">
-                <a:latin typeface="Consolas" panose="020B0609020204030204" pitchFamily="49" charset="0"/>
-              </a:rPr>
-              <a:t>df.sample</a:t>
-            </a:r>
-            <a:r>
-              <a:rPr lang="en-US" sz="1200" b="1" dirty="0" smtClean="0">
-                <a:latin typeface="Consolas" panose="020B0609020204030204" pitchFamily="49" charset="0"/>
-              </a:rPr>
-              <a:t>(n=10)</a:t>
+              <a:t>(n)</a:t>
             </a:r>
             <a:endParaRPr lang="en-US" sz="1200" b="1" dirty="0">
               <a:latin typeface="Consolas" panose="020B0609020204030204" pitchFamily="49" charset="0"/>
             </a:endParaRPr>
           </a:p>
           <a:p>
+            <a:pPr marL="174625"/>
             <a:r>
               <a:rPr lang="en-US" sz="1200" dirty="0" smtClean="0"/>
-              <a:t>     Randomly </a:t>
-            </a:r>
+              <a:t>Select first n rows.</a:t>
+            </a:r>
+          </a:p>
+          <a:p>
+            <a:r>
+              <a:rPr lang="en-US" sz="1200" b="1" dirty="0" err="1" smtClean="0">
+                <a:latin typeface="Consolas" panose="020B0609020204030204" pitchFamily="49" charset="0"/>
+              </a:rPr>
+              <a:t>df.tail</a:t>
+            </a:r>
+            <a:r>
+              <a:rPr lang="en-US" sz="1200" b="1" dirty="0" smtClean="0">
+                <a:latin typeface="Consolas" panose="020B0609020204030204" pitchFamily="49" charset="0"/>
+              </a:rPr>
+              <a:t>(n</a:t>
+            </a:r>
+            <a:r>
+              <a:rPr lang="en-US" sz="1200" b="1" dirty="0">
+                <a:latin typeface="Consolas" panose="020B0609020204030204" pitchFamily="49" charset="0"/>
+              </a:rPr>
+              <a:t>)</a:t>
+            </a:r>
+          </a:p>
+          <a:p>
+            <a:pPr marL="174625"/>
             <a:r>
               <a:rPr lang="en-US" sz="1200" dirty="0"/>
-              <a:t>select </a:t>
+              <a:t>Select </a:t>
             </a:r>
             <a:r>
               <a:rPr lang="en-US" sz="1200" dirty="0" smtClean="0"/>
-              <a:t>n rows.</a:t>
-            </a:r>
-            <a:endParaRPr lang="en-US" sz="1200" dirty="0"/>
-          </a:p>
-          <a:p>
-            <a:r>
-              <a:rPr lang="en-US" sz="1200" b="1" dirty="0" err="1" smtClean="0">
-                <a:latin typeface="Consolas" panose="020B0609020204030204" pitchFamily="49" charset="0"/>
-              </a:rPr>
-              <a:t>df.iloc</a:t>
-            </a:r>
-            <a:r>
-              <a:rPr lang="en-US" sz="1200" b="1" dirty="0" smtClean="0">
-                <a:latin typeface="Consolas" panose="020B0609020204030204" pitchFamily="49" charset="0"/>
-              </a:rPr>
-              <a:t>[10:20]</a:t>
-            </a:r>
-          </a:p>
-          <a:p>
+              <a:t>last n </a:t>
+            </a:r>
             <a:r>
               <a:rPr lang="en-US" sz="1200" dirty="0"/>
-              <a:t> </a:t>
+              <a:t>rows</a:t>
             </a:r>
             <a:r>
               <a:rPr lang="en-US" sz="1200" dirty="0" smtClean="0"/>
-              <a:t>    Select rows by position.</a:t>
-            </a:r>
-            <a:endParaRPr lang="en-US" sz="1200" dirty="0"/>
-          </a:p>
-          <a:p>
-            <a:r>
-              <a:rPr lang="en-US" sz="1200" b="1" dirty="0" err="1" smtClean="0">
-                <a:latin typeface="Consolas" panose="020B0609020204030204" pitchFamily="49" charset="0"/>
-              </a:rPr>
-              <a:t>df.nlargest</a:t>
-            </a:r>
-            <a:r>
-              <a:rPr lang="en-US" sz="1200" b="1" dirty="0" smtClean="0">
-                <a:latin typeface="Consolas" panose="020B0609020204030204" pitchFamily="49" charset="0"/>
-              </a:rPr>
-              <a:t>(10, 'value')</a:t>
-            </a:r>
-          </a:p>
-          <a:p>
-            <a:r>
-              <a:rPr lang="en-US" sz="1200" dirty="0"/>
-              <a:t> </a:t>
-            </a:r>
-            <a:r>
-              <a:rPr lang="en-US" sz="1200" dirty="0" smtClean="0"/>
-              <a:t>    Select and order top n entries.</a:t>
+              <a:t>.</a:t>
             </a:r>
             <a:endParaRPr lang="en-US" sz="1200" dirty="0"/>
           </a:p>
@@ -12726,14 +12670,14 @@
           <p:nvPr>
             <p:extLst>
               <p:ext uri="{D42A27DB-BD31-4B8C-83A1-F6EECF244321}">
-                <p14:modId xmlns:p14="http://schemas.microsoft.com/office/powerpoint/2010/main" val="2914391951"/>
+                <p14:modId xmlns:p14="http://schemas.microsoft.com/office/powerpoint/2010/main" val="2405697195"/>
               </p:ext>
             </p:extLst>
           </p:nvPr>
         </p:nvGraphicFramePr>
         <p:xfrm>
           <a:off x="3946615" y="9243804"/>
-          <a:ext cx="4706255" cy="1374905"/>
+          <a:ext cx="4814590" cy="1374905"/>
         </p:xfrm>
         <a:graphic>
           <a:graphicData uri="http://schemas.openxmlformats.org/drawingml/2006/table">
@@ -12742,10 +12686,10 @@
                 <a:tableStyleId>{5C22544A-7EE6-4342-B048-85BDC9FD1C3A}</a:tableStyleId>
               </a:tblPr>
               <a:tblGrid>
-                <a:gridCol w="225695"/>
-                <a:gridCol w="1143000"/>
-                <a:gridCol w="1737360"/>
-                <a:gridCol w="1600200"/>
+                <a:gridCol w="230890"/>
+                <a:gridCol w="1175988"/>
+                <a:gridCol w="1770676"/>
+                <a:gridCol w="1637036"/>
               </a:tblGrid>
               <a:tr h="231905">
                 <a:tc gridSpan="4">
@@ -13037,7 +12981,7 @@
                       <a:headEnd type="none" w="med" len="med"/>
                       <a:tailEnd type="none" w="med" len="med"/>
                     </a:lnL>
-                    <a:lnR w="12700" cap="flat" cmpd="sng" algn="ctr">
+                    <a:lnR w="76200" cap="flat" cmpd="sng" algn="ctr">
                       <a:solidFill>
                         <a:schemeClr val="accent5"/>
                       </a:solidFill>
@@ -13088,7 +13032,7 @@
                     </a:p>
                   </a:txBody>
                   <a:tcPr marL="45720" marR="45720">
-                    <a:lnL w="12700" cap="flat" cmpd="sng" algn="ctr">
+                    <a:lnL w="76200" cap="flat" cmpd="sng" algn="ctr">
                       <a:solidFill>
                         <a:schemeClr val="accent5"/>
                       </a:solidFill>
@@ -13271,7 +13215,7 @@
                       <a:headEnd type="none" w="med" len="med"/>
                       <a:tailEnd type="none" w="med" len="med"/>
                     </a:lnL>
-                    <a:lnR w="12700" cap="flat" cmpd="sng" algn="ctr">
+                    <a:lnR w="76200" cap="flat" cmpd="sng" algn="ctr">
                       <a:solidFill>
                         <a:schemeClr val="accent5"/>
                       </a:solidFill>
@@ -13340,7 +13284,7 @@
                     </a:p>
                   </a:txBody>
                   <a:tcPr marL="45720" marR="45720">
-                    <a:lnL w="12700" cap="flat" cmpd="sng" algn="ctr">
+                    <a:lnL w="76200" cap="flat" cmpd="sng" algn="ctr">
                       <a:solidFill>
                         <a:schemeClr val="accent5"/>
                       </a:solidFill>
@@ -13523,7 +13467,7 @@
                       <a:headEnd type="none" w="med" len="med"/>
                       <a:tailEnd type="none" w="med" len="med"/>
                     </a:lnL>
-                    <a:lnR w="12700" cap="flat" cmpd="sng" algn="ctr">
+                    <a:lnR w="76200" cap="flat" cmpd="sng" algn="ctr">
                       <a:solidFill>
                         <a:schemeClr val="accent5"/>
                       </a:solidFill>
@@ -13592,7 +13536,7 @@
                     </a:p>
                   </a:txBody>
                   <a:tcPr marL="45720" marR="45720">
-                    <a:lnL w="12700" cap="flat" cmpd="sng" algn="ctr">
+                    <a:lnL w="76200" cap="flat" cmpd="sng" algn="ctr">
                       <a:solidFill>
                         <a:schemeClr val="accent5"/>
                       </a:solidFill>
@@ -13779,7 +13723,7 @@
                       <a:headEnd type="none" w="med" len="med"/>
                       <a:tailEnd type="none" w="med" len="med"/>
                     </a:lnL>
-                    <a:lnR w="12700" cap="flat" cmpd="sng" algn="ctr">
+                    <a:lnR w="76200" cap="flat" cmpd="sng" algn="ctr">
                       <a:solidFill>
                         <a:schemeClr val="accent5"/>
                       </a:solidFill>
@@ -13848,7 +13792,7 @@
                     </a:p>
                   </a:txBody>
                   <a:tcPr marL="45720" marR="45720">
-                    <a:lnL w="12700" cap="flat" cmpd="sng" algn="ctr">
+                    <a:lnL w="76200" cap="flat" cmpd="sng" algn="ctr">
                       <a:solidFill>
                         <a:schemeClr val="accent5"/>
                       </a:solidFill>
@@ -14035,7 +13979,7 @@
                       <a:headEnd type="none" w="med" len="med"/>
                       <a:tailEnd type="none" w="med" len="med"/>
                     </a:lnL>
-                    <a:lnR w="12700" cap="flat" cmpd="sng" algn="ctr">
+                    <a:lnR w="76200" cap="flat" cmpd="sng" algn="ctr">
                       <a:solidFill>
                         <a:schemeClr val="accent5"/>
                       </a:solidFill>
@@ -14110,7 +14054,7 @@
                     </a:p>
                   </a:txBody>
                   <a:tcPr marL="45720" marR="45720">
-                    <a:lnL w="12700" cap="flat" cmpd="sng" algn="ctr">
+                    <a:lnL w="76200" cap="flat" cmpd="sng" algn="ctr">
                       <a:solidFill>
                         <a:schemeClr val="accent5"/>
                       </a:solidFill>
@@ -14292,11 +14236,7 @@
             </a:r>
             <a:r>
               <a:rPr lang="en-US" sz="800" dirty="0" smtClean="0"/>
-              <a:t>) </a:t>
-            </a:r>
-            <a:r>
-              <a:rPr lang="en-US" sz="800" dirty="0" smtClean="0"/>
-              <a:t> Written by Irv Lustig, </a:t>
+              <a:t>)  Written by Irv Lustig, </a:t>
             </a:r>
             <a:r>
               <a:rPr lang="en-US" sz="800" dirty="0" smtClean="0">
@@ -16284,6 +16224,178 @@
           </a:graphicData>
         </a:graphic>
       </p:graphicFrame>
+      <p:sp>
+        <p:nvSpPr>
+          <p:cNvPr id="89" name="TextBox 88"/>
+          <p:cNvSpPr txBox="1"/>
+          <p:nvPr/>
+        </p:nvSpPr>
+        <p:spPr>
+          <a:xfrm>
+            <a:off x="6331165" y="7063240"/>
+            <a:ext cx="2492075" cy="1938992"/>
+          </a:xfrm>
+          <a:prstGeom prst="rect">
+            <a:avLst/>
+          </a:prstGeom>
+          <a:noFill/>
+        </p:spPr>
+        <p:txBody>
+          <a:bodyPr wrap="square" rtlCol="0">
+            <a:spAutoFit/>
+          </a:bodyPr>
+          <a:lstStyle/>
+          <a:p>
+            <a:r>
+              <a:rPr lang="en-US" sz="1200" b="1" dirty="0" err="1">
+                <a:latin typeface="Consolas" panose="020B0609020204030204" pitchFamily="49" charset="0"/>
+              </a:rPr>
+              <a:t>df.sample</a:t>
+            </a:r>
+            <a:r>
+              <a:rPr lang="en-US" sz="1200" b="1" dirty="0">
+                <a:latin typeface="Consolas" panose="020B0609020204030204" pitchFamily="49" charset="0"/>
+              </a:rPr>
+              <a:t>(</a:t>
+            </a:r>
+            <a:r>
+              <a:rPr lang="en-US" sz="1200" b="1" dirty="0" err="1">
+                <a:latin typeface="Consolas" panose="020B0609020204030204" pitchFamily="49" charset="0"/>
+              </a:rPr>
+              <a:t>frac</a:t>
+            </a:r>
+            <a:r>
+              <a:rPr lang="en-US" sz="1200" b="1" dirty="0">
+                <a:latin typeface="Consolas" panose="020B0609020204030204" pitchFamily="49" charset="0"/>
+              </a:rPr>
+              <a:t>=0.5)</a:t>
+            </a:r>
+          </a:p>
+          <a:p>
+            <a:pPr marL="174625"/>
+            <a:r>
+              <a:rPr lang="en-US" sz="1200" dirty="0" smtClean="0"/>
+              <a:t>Randomly </a:t>
+            </a:r>
+            <a:r>
+              <a:rPr lang="en-US" sz="1200" dirty="0"/>
+              <a:t>select fraction of rows. </a:t>
+            </a:r>
+          </a:p>
+          <a:p>
+            <a:r>
+              <a:rPr lang="en-US" sz="1200" b="1" dirty="0" err="1" smtClean="0">
+                <a:latin typeface="Consolas" panose="020B0609020204030204" pitchFamily="49" charset="0"/>
+              </a:rPr>
+              <a:t>df.sample</a:t>
+            </a:r>
+            <a:r>
+              <a:rPr lang="en-US" sz="1200" b="1" dirty="0" smtClean="0">
+                <a:latin typeface="Consolas" panose="020B0609020204030204" pitchFamily="49" charset="0"/>
+              </a:rPr>
+              <a:t>(n=10)</a:t>
+            </a:r>
+            <a:endParaRPr lang="en-US" sz="1200" b="1" dirty="0">
+              <a:latin typeface="Consolas" panose="020B0609020204030204" pitchFamily="49" charset="0"/>
+            </a:endParaRPr>
+          </a:p>
+          <a:p>
+            <a:r>
+              <a:rPr lang="en-US" sz="1200" dirty="0" smtClean="0"/>
+              <a:t>     Randomly </a:t>
+            </a:r>
+            <a:r>
+              <a:rPr lang="en-US" sz="1200" dirty="0"/>
+              <a:t>select </a:t>
+            </a:r>
+            <a:r>
+              <a:rPr lang="en-US" sz="1200" dirty="0" smtClean="0"/>
+              <a:t>n rows.</a:t>
+            </a:r>
+            <a:endParaRPr lang="en-US" sz="1200" dirty="0"/>
+          </a:p>
+          <a:p>
+            <a:r>
+              <a:rPr lang="en-US" sz="1200" b="1" dirty="0" err="1" smtClean="0">
+                <a:latin typeface="Consolas" panose="020B0609020204030204" pitchFamily="49" charset="0"/>
+              </a:rPr>
+              <a:t>df.iloc</a:t>
+            </a:r>
+            <a:r>
+              <a:rPr lang="en-US" sz="1200" b="1" dirty="0" smtClean="0">
+                <a:latin typeface="Consolas" panose="020B0609020204030204" pitchFamily="49" charset="0"/>
+              </a:rPr>
+              <a:t>[10:20]</a:t>
+            </a:r>
+          </a:p>
+          <a:p>
+            <a:r>
+              <a:rPr lang="en-US" sz="1200" dirty="0"/>
+              <a:t> </a:t>
+            </a:r>
+            <a:r>
+              <a:rPr lang="en-US" sz="1200" dirty="0" smtClean="0"/>
+              <a:t>    Select rows by position.</a:t>
+            </a:r>
+            <a:endParaRPr lang="en-US" sz="1200" dirty="0"/>
+          </a:p>
+          <a:p>
+            <a:r>
+              <a:rPr lang="en-US" sz="1200" b="1" dirty="0" err="1" smtClean="0">
+                <a:latin typeface="Consolas" panose="020B0609020204030204" pitchFamily="49" charset="0"/>
+              </a:rPr>
+              <a:t>df.nlargest</a:t>
+            </a:r>
+            <a:r>
+              <a:rPr lang="en-US" sz="1200" b="1" dirty="0" smtClean="0">
+                <a:latin typeface="Consolas" panose="020B0609020204030204" pitchFamily="49" charset="0"/>
+              </a:rPr>
+              <a:t>(n, 'value')</a:t>
+            </a:r>
+          </a:p>
+          <a:p>
+            <a:r>
+              <a:rPr lang="en-US" sz="1200" dirty="0"/>
+              <a:t> </a:t>
+            </a:r>
+            <a:r>
+              <a:rPr lang="en-US" sz="1200" dirty="0" smtClean="0"/>
+              <a:t>    Select and order top n entries.</a:t>
+            </a:r>
+          </a:p>
+          <a:p>
+            <a:r>
+              <a:rPr lang="en-US" sz="1200" b="1" dirty="0" err="1" smtClean="0">
+                <a:latin typeface="Consolas" panose="020B0609020204030204" pitchFamily="49" charset="0"/>
+              </a:rPr>
+              <a:t>df.nsmallest</a:t>
+            </a:r>
+            <a:r>
+              <a:rPr lang="en-US" sz="1200" b="1" dirty="0" smtClean="0">
+                <a:latin typeface="Consolas" panose="020B0609020204030204" pitchFamily="49" charset="0"/>
+              </a:rPr>
+              <a:t>(n, </a:t>
+            </a:r>
+            <a:r>
+              <a:rPr lang="en-US" sz="1200" b="1" dirty="0">
+                <a:latin typeface="Consolas" panose="020B0609020204030204" pitchFamily="49" charset="0"/>
+              </a:rPr>
+              <a:t>'value')</a:t>
+            </a:r>
+          </a:p>
+          <a:p>
+            <a:pPr marL="174625"/>
+            <a:r>
+              <a:rPr lang="en-US" sz="1200" dirty="0" smtClean="0"/>
+              <a:t>Select </a:t>
+            </a:r>
+            <a:r>
+              <a:rPr lang="en-US" sz="1200" dirty="0"/>
+              <a:t>and order bottom n entries.</a:t>
+            </a:r>
+          </a:p>
+        </p:txBody>
+      </p:sp>
     </p:spTree>
     <p:extLst>
       <p:ext uri="{BB962C8B-B14F-4D97-AF65-F5344CB8AC3E}">
@@ -22336,7 +22448,19 @@
               <a:rPr lang="en-US" sz="1200" b="1" dirty="0">
                 <a:latin typeface="Consolas" panose="020B0609020204030204" pitchFamily="49" charset="0"/>
               </a:rPr>
-              <a:t>         how='inner', on='x1')</a:t>
+              <a:t>         how=</a:t>
+            </a:r>
+            <a:r>
+              <a:rPr lang="en-US" sz="1200" b="1" dirty="0" smtClean="0">
+                <a:latin typeface="Consolas" panose="020B0609020204030204" pitchFamily="49" charset="0"/>
+              </a:rPr>
+              <a:t>'outer</a:t>
+            </a:r>
+            <a:r>
+              <a:rPr lang="en-US" sz="1200" b="1" dirty="0">
+                <a:latin typeface="Consolas" panose="020B0609020204030204" pitchFamily="49" charset="0"/>
+              </a:rPr>
+              <a:t>', on='x1')</a:t>
             </a:r>
           </a:p>
           <a:p>

</xml_diff>

<commit_message>
docs cheat sheet pandas Pd to pd (#15026)
Change pandas syntax from Pd to pd
</commit_message>
<xml_diff>
--- a/doc/cheatsheet/Pandas_Cheat_Sheet.pptx
+++ b/doc/cheatsheet/Pandas_Cheat_Sheet.pptx
@@ -244,7 +244,7 @@
           <a:p>
             <a:fld id="{79278B33-2949-49BE-B3B0-3F16CAF906FE}" type="datetimeFigureOut">
               <a:rPr lang="en-US" smtClean="0"/>
-              <a:t>12/22/2016</a:t>
+              <a:t>12/31/2016</a:t>
             </a:fld>
             <a:endParaRPr lang="en-US"/>
           </a:p>
@@ -414,7 +414,7 @@
           <a:p>
             <a:fld id="{79278B33-2949-49BE-B3B0-3F16CAF906FE}" type="datetimeFigureOut">
               <a:rPr lang="en-US" smtClean="0"/>
-              <a:t>12/22/2016</a:t>
+              <a:t>12/31/2016</a:t>
             </a:fld>
             <a:endParaRPr lang="en-US"/>
           </a:p>
@@ -594,7 +594,7 @@
           <a:p>
             <a:fld id="{79278B33-2949-49BE-B3B0-3F16CAF906FE}" type="datetimeFigureOut">
               <a:rPr lang="en-US" smtClean="0"/>
-              <a:t>12/22/2016</a:t>
+              <a:t>12/31/2016</a:t>
             </a:fld>
             <a:endParaRPr lang="en-US"/>
           </a:p>
@@ -764,7 +764,7 @@
           <a:p>
             <a:fld id="{79278B33-2949-49BE-B3B0-3F16CAF906FE}" type="datetimeFigureOut">
               <a:rPr lang="en-US" smtClean="0"/>
-              <a:t>12/22/2016</a:t>
+              <a:t>12/31/2016</a:t>
             </a:fld>
             <a:endParaRPr lang="en-US"/>
           </a:p>
@@ -1008,7 +1008,7 @@
           <a:p>
             <a:fld id="{79278B33-2949-49BE-B3B0-3F16CAF906FE}" type="datetimeFigureOut">
               <a:rPr lang="en-US" smtClean="0"/>
-              <a:t>12/22/2016</a:t>
+              <a:t>12/31/2016</a:t>
             </a:fld>
             <a:endParaRPr lang="en-US"/>
           </a:p>
@@ -1240,7 +1240,7 @@
           <a:p>
             <a:fld id="{79278B33-2949-49BE-B3B0-3F16CAF906FE}" type="datetimeFigureOut">
               <a:rPr lang="en-US" smtClean="0"/>
-              <a:t>12/22/2016</a:t>
+              <a:t>12/31/2016</a:t>
             </a:fld>
             <a:endParaRPr lang="en-US"/>
           </a:p>
@@ -1607,7 +1607,7 @@
           <a:p>
             <a:fld id="{79278B33-2949-49BE-B3B0-3F16CAF906FE}" type="datetimeFigureOut">
               <a:rPr lang="en-US" smtClean="0"/>
-              <a:t>12/22/2016</a:t>
+              <a:t>12/31/2016</a:t>
             </a:fld>
             <a:endParaRPr lang="en-US"/>
           </a:p>
@@ -1725,7 +1725,7 @@
           <a:p>
             <a:fld id="{79278B33-2949-49BE-B3B0-3F16CAF906FE}" type="datetimeFigureOut">
               <a:rPr lang="en-US" smtClean="0"/>
-              <a:t>12/22/2016</a:t>
+              <a:t>12/31/2016</a:t>
             </a:fld>
             <a:endParaRPr lang="en-US"/>
           </a:p>
@@ -1820,7 +1820,7 @@
           <a:p>
             <a:fld id="{79278B33-2949-49BE-B3B0-3F16CAF906FE}" type="datetimeFigureOut">
               <a:rPr lang="en-US" smtClean="0"/>
-              <a:t>12/22/2016</a:t>
+              <a:t>12/31/2016</a:t>
             </a:fld>
             <a:endParaRPr lang="en-US"/>
           </a:p>
@@ -2097,7 +2097,7 @@
           <a:p>
             <a:fld id="{79278B33-2949-49BE-B3B0-3F16CAF906FE}" type="datetimeFigureOut">
               <a:rPr lang="en-US" smtClean="0"/>
-              <a:t>12/22/2016</a:t>
+              <a:t>12/31/2016</a:t>
             </a:fld>
             <a:endParaRPr lang="en-US"/>
           </a:p>
@@ -2354,7 +2354,7 @@
           <a:p>
             <a:fld id="{79278B33-2949-49BE-B3B0-3F16CAF906FE}" type="datetimeFigureOut">
               <a:rPr lang="en-US" smtClean="0"/>
-              <a:t>12/22/2016</a:t>
+              <a:t>12/31/2016</a:t>
             </a:fld>
             <a:endParaRPr lang="en-US"/>
           </a:p>
@@ -2567,7 +2567,7 @@
           <a:p>
             <a:fld id="{79278B33-2949-49BE-B3B0-3F16CAF906FE}" type="datetimeFigureOut">
               <a:rPr lang="en-US" smtClean="0"/>
-              <a:t>12/22/2016</a:t>
+              <a:t>12/31/2016</a:t>
             </a:fld>
             <a:endParaRPr lang="en-US"/>
           </a:p>
@@ -12670,7 +12670,7 @@
           <p:nvPr>
             <p:extLst>
               <p:ext uri="{D42A27DB-BD31-4B8C-83A1-F6EECF244321}">
-                <p14:modId xmlns:p14="http://schemas.microsoft.com/office/powerpoint/2010/main" val="2405697195"/>
+                <p14:modId xmlns:p14="http://schemas.microsoft.com/office/powerpoint/2010/main" val="4256108172"/>
               </p:ext>
             </p:extLst>
           </p:nvPr>
@@ -13763,10 +13763,10 @@
                     <a:lstStyle/>
                     <a:p>
                       <a:r>
-                        <a:rPr lang="en-US" sz="900" b="1" dirty="0" err="1" smtClean="0">
+                        <a:rPr lang="en-US" sz="900" b="1" smtClean="0">
                           <a:latin typeface="Consolas" panose="020B0609020204030204" pitchFamily="49" charset="0"/>
                         </a:rPr>
-                        <a:t>Pd.notnull</a:t>
+                        <a:t>pd.notnull</a:t>
                       </a:r>
                       <a:r>
                         <a:rPr lang="en-US" sz="900" b="1" dirty="0" smtClean="0">

</xml_diff>

<commit_message>
DOC: cheatsheet - make various minor corrections (#16136)
</commit_message>
<xml_diff>
--- a/doc/cheatsheet/Pandas_Cheat_Sheet.pptx
+++ b/doc/cheatsheet/Pandas_Cheat_Sheet.pptx
@@ -107,7 +107,7 @@
   </p:defaultTextStyle>
   <p:extLst>
     <p:ext uri="{EFAFB233-063F-42B5-8137-9DF3F51BA10A}">
-      <p15:sldGuideLst xmlns:p15="http://schemas.microsoft.com/office/powerpoint/2012/main"/>
+      <p15:sldGuideLst xmlns:p15="http://schemas.microsoft.com/office/powerpoint/2012/main" xmlns=""/>
     </p:ext>
   </p:extLst>
 </p:presentation>
@@ -244,7 +244,7 @@
           <a:p>
             <a:fld id="{79278B33-2949-49BE-B3B0-3F16CAF906FE}" type="datetimeFigureOut">
               <a:rPr lang="en-US" smtClean="0"/>
-              <a:t>12/31/2016</a:t>
+              <a:t>4/25/17</a:t>
             </a:fld>
             <a:endParaRPr lang="en-US"/>
           </a:p>
@@ -414,7 +414,7 @@
           <a:p>
             <a:fld id="{79278B33-2949-49BE-B3B0-3F16CAF906FE}" type="datetimeFigureOut">
               <a:rPr lang="en-US" smtClean="0"/>
-              <a:t>12/31/2016</a:t>
+              <a:t>4/25/17</a:t>
             </a:fld>
             <a:endParaRPr lang="en-US"/>
           </a:p>
@@ -594,7 +594,7 @@
           <a:p>
             <a:fld id="{79278B33-2949-49BE-B3B0-3F16CAF906FE}" type="datetimeFigureOut">
               <a:rPr lang="en-US" smtClean="0"/>
-              <a:t>12/31/2016</a:t>
+              <a:t>4/25/17</a:t>
             </a:fld>
             <a:endParaRPr lang="en-US"/>
           </a:p>
@@ -764,7 +764,7 @@
           <a:p>
             <a:fld id="{79278B33-2949-49BE-B3B0-3F16CAF906FE}" type="datetimeFigureOut">
               <a:rPr lang="en-US" smtClean="0"/>
-              <a:t>12/31/2016</a:t>
+              <a:t>4/25/17</a:t>
             </a:fld>
             <a:endParaRPr lang="en-US"/>
           </a:p>
@@ -1008,7 +1008,7 @@
           <a:p>
             <a:fld id="{79278B33-2949-49BE-B3B0-3F16CAF906FE}" type="datetimeFigureOut">
               <a:rPr lang="en-US" smtClean="0"/>
-              <a:t>12/31/2016</a:t>
+              <a:t>4/25/17</a:t>
             </a:fld>
             <a:endParaRPr lang="en-US"/>
           </a:p>
@@ -1240,7 +1240,7 @@
           <a:p>
             <a:fld id="{79278B33-2949-49BE-B3B0-3F16CAF906FE}" type="datetimeFigureOut">
               <a:rPr lang="en-US" smtClean="0"/>
-              <a:t>12/31/2016</a:t>
+              <a:t>4/25/17</a:t>
             </a:fld>
             <a:endParaRPr lang="en-US"/>
           </a:p>
@@ -1607,7 +1607,7 @@
           <a:p>
             <a:fld id="{79278B33-2949-49BE-B3B0-3F16CAF906FE}" type="datetimeFigureOut">
               <a:rPr lang="en-US" smtClean="0"/>
-              <a:t>12/31/2016</a:t>
+              <a:t>4/25/17</a:t>
             </a:fld>
             <a:endParaRPr lang="en-US"/>
           </a:p>
@@ -1725,7 +1725,7 @@
           <a:p>
             <a:fld id="{79278B33-2949-49BE-B3B0-3F16CAF906FE}" type="datetimeFigureOut">
               <a:rPr lang="en-US" smtClean="0"/>
-              <a:t>12/31/2016</a:t>
+              <a:t>4/25/17</a:t>
             </a:fld>
             <a:endParaRPr lang="en-US"/>
           </a:p>
@@ -1820,7 +1820,7 @@
           <a:p>
             <a:fld id="{79278B33-2949-49BE-B3B0-3F16CAF906FE}" type="datetimeFigureOut">
               <a:rPr lang="en-US" smtClean="0"/>
-              <a:t>12/31/2016</a:t>
+              <a:t>4/25/17</a:t>
             </a:fld>
             <a:endParaRPr lang="en-US"/>
           </a:p>
@@ -2097,7 +2097,7 @@
           <a:p>
             <a:fld id="{79278B33-2949-49BE-B3B0-3F16CAF906FE}" type="datetimeFigureOut">
               <a:rPr lang="en-US" smtClean="0"/>
-              <a:t>12/31/2016</a:t>
+              <a:t>4/25/17</a:t>
             </a:fld>
             <a:endParaRPr lang="en-US"/>
           </a:p>
@@ -2354,7 +2354,7 @@
           <a:p>
             <a:fld id="{79278B33-2949-49BE-B3B0-3F16CAF906FE}" type="datetimeFigureOut">
               <a:rPr lang="en-US" smtClean="0"/>
-              <a:t>12/31/2016</a:t>
+              <a:t>4/25/17</a:t>
             </a:fld>
             <a:endParaRPr lang="en-US"/>
           </a:p>
@@ -2567,7 +2567,7 @@
           <a:p>
             <a:fld id="{79278B33-2949-49BE-B3B0-3F16CAF906FE}" type="datetimeFigureOut">
               <a:rPr lang="en-US" smtClean="0"/>
-              <a:t>12/31/2016</a:t>
+              <a:t>4/25/17</a:t>
             </a:fld>
             <a:endParaRPr lang="en-US"/>
           </a:p>
@@ -7903,18 +7903,6 @@
               <a:rPr lang="en-US" sz="1200" b="1" dirty="0" err="1" smtClean="0">
                 <a:latin typeface="Consolas" panose="020B0609020204030204" pitchFamily="49" charset="0"/>
               </a:rPr>
-              <a:t>df</a:t>
-            </a:r>
-            <a:r>
-              <a:rPr lang="en-US" sz="1200" b="1" dirty="0" smtClean="0">
-                <a:latin typeface="Consolas" panose="020B0609020204030204" pitchFamily="49" charset="0"/>
-              </a:rPr>
-              <a:t>=</a:t>
-            </a:r>
-            <a:r>
-              <a:rPr lang="en-US" sz="1200" b="1" dirty="0" err="1" smtClean="0">
-                <a:latin typeface="Consolas" panose="020B0609020204030204" pitchFamily="49" charset="0"/>
-              </a:rPr>
               <a:t>df.sort_values</a:t>
             </a:r>
             <a:r>
@@ -7967,19 +7955,7 @@
           </a:p>
           <a:p>
             <a:r>
-              <a:rPr lang="en-US" sz="1200" b="1" dirty="0" err="1">
-                <a:latin typeface="Consolas" panose="020B0609020204030204" pitchFamily="49" charset="0"/>
-              </a:rPr>
-              <a:t>df</a:t>
-            </a:r>
-            <a:r>
-              <a:rPr lang="en-US" sz="1200" b="1" dirty="0">
-                <a:latin typeface="Consolas" panose="020B0609020204030204" pitchFamily="49" charset="0"/>
-              </a:rPr>
-              <a:t>=</a:t>
-            </a:r>
-            <a:r>
-              <a:rPr lang="en-US" sz="1200" b="1" dirty="0" err="1">
+              <a:rPr lang="en-US" sz="1200" b="1" dirty="0" err="1" smtClean="0">
                 <a:latin typeface="Consolas" panose="020B0609020204030204" pitchFamily="49" charset="0"/>
               </a:rPr>
               <a:t>df.sort_values</a:t>
@@ -8031,18 +8007,6 @@
               <a:rPr lang="en-US" sz="1200" b="1" dirty="0" err="1" smtClean="0">
                 <a:latin typeface="Consolas" panose="020B0609020204030204" pitchFamily="49" charset="0"/>
               </a:rPr>
-              <a:t>df</a:t>
-            </a:r>
-            <a:r>
-              <a:rPr lang="en-US" sz="1200" b="1" dirty="0" smtClean="0">
-                <a:latin typeface="Consolas" panose="020B0609020204030204" pitchFamily="49" charset="0"/>
-              </a:rPr>
-              <a:t>=</a:t>
-            </a:r>
-            <a:r>
-              <a:rPr lang="en-US" sz="1200" b="1" dirty="0" err="1" smtClean="0">
-                <a:latin typeface="Consolas" panose="020B0609020204030204" pitchFamily="49" charset="0"/>
-              </a:rPr>
               <a:t>df.rename</a:t>
             </a:r>
             <a:r>
@@ -8091,18 +8055,6 @@
               <a:rPr lang="en-US" sz="1200" b="1" dirty="0" err="1" smtClean="0">
                 <a:latin typeface="Consolas" panose="020B0609020204030204" pitchFamily="49" charset="0"/>
               </a:rPr>
-              <a:t>df</a:t>
-            </a:r>
-            <a:r>
-              <a:rPr lang="en-US" sz="1200" b="1" dirty="0" smtClean="0">
-                <a:latin typeface="Consolas" panose="020B0609020204030204" pitchFamily="49" charset="0"/>
-              </a:rPr>
-              <a:t>=</a:t>
-            </a:r>
-            <a:r>
-              <a:rPr lang="en-US" sz="1200" b="1" dirty="0" err="1" smtClean="0">
-                <a:latin typeface="Consolas" panose="020B0609020204030204" pitchFamily="49" charset="0"/>
-              </a:rPr>
               <a:t>df.sort_index</a:t>
             </a:r>
             <a:r>
@@ -8136,18 +8088,6 @@
               <a:rPr lang="en-US" sz="1200" b="1" dirty="0" err="1" smtClean="0">
                 <a:latin typeface="Consolas" panose="020B0609020204030204" pitchFamily="49" charset="0"/>
               </a:rPr>
-              <a:t>df</a:t>
-            </a:r>
-            <a:r>
-              <a:rPr lang="en-US" sz="1200" b="1" dirty="0" smtClean="0">
-                <a:latin typeface="Consolas" panose="020B0609020204030204" pitchFamily="49" charset="0"/>
-              </a:rPr>
-              <a:t>=</a:t>
-            </a:r>
-            <a:r>
-              <a:rPr lang="en-US" sz="1200" b="1" dirty="0" err="1" smtClean="0">
-                <a:latin typeface="Consolas" panose="020B0609020204030204" pitchFamily="49" charset="0"/>
-              </a:rPr>
               <a:t>df.reset_index</a:t>
             </a:r>
             <a:r>
@@ -8190,19 +8130,7 @@
           </a:p>
           <a:p>
             <a:r>
-              <a:rPr lang="en-US" sz="1200" b="1" dirty="0" err="1">
-                <a:latin typeface="Consolas" panose="020B0609020204030204" pitchFamily="49" charset="0"/>
-              </a:rPr>
-              <a:t>df</a:t>
-            </a:r>
-            <a:r>
-              <a:rPr lang="en-US" sz="1200" b="1" dirty="0">
-                <a:latin typeface="Consolas" panose="020B0609020204030204" pitchFamily="49" charset="0"/>
-              </a:rPr>
-              <a:t>=</a:t>
-            </a:r>
-            <a:r>
-              <a:rPr lang="en-US" sz="1200" b="1" dirty="0" err="1">
+              <a:rPr lang="en-US" sz="1200" b="1" dirty="0" err="1" smtClean="0">
                 <a:latin typeface="Consolas" panose="020B0609020204030204" pitchFamily="49" charset="0"/>
               </a:rPr>
               <a:t>df.drop</a:t>
@@ -11057,14 +10985,14 @@
           </a:ln>
           <a:effectLst/>
           <a:extLst>
-            <a:ext uri="{909E8E84-426E-40DD-AFC4-6F175D3DCCD1}">
+            <a:ext uri="{909E8E84-426E-40dd-AFC4-6F175D3DCCD1}">
               <a14:hiddenFill xmlns:a14="http://schemas.microsoft.com/office/drawing/2010/main">
                 <a:solidFill>
                   <a:schemeClr val="accent1"/>
                 </a:solidFill>
               </a14:hiddenFill>
             </a:ext>
-            <a:ext uri="{91240B29-F687-4F45-9708-019B960494DF}">
+            <a:ext uri="{91240B29-F687-4f45-9708-019B960494DF}">
               <a14:hiddenLine xmlns:a14="http://schemas.microsoft.com/office/drawing/2010/main" w="9525">
                 <a:solidFill>
                   <a:schemeClr val="tx1"/>
@@ -11074,7 +11002,7 @@
                 <a:tailEnd/>
               </a14:hiddenLine>
             </a:ext>
-            <a:ext uri="{AF507438-7753-43E0-B8FC-AC1667EBCBE1}">
+            <a:ext uri="{AF507438-7753-43e0-B8FC-AC1667EBCBE1}">
               <a14:hiddenEffects xmlns:a14="http://schemas.microsoft.com/office/drawing/2010/main">
                 <a:effectLst>
                   <a:outerShdw dist="35921" dir="2700000" algn="ctr" rotWithShape="0">
@@ -16409,7 +16337,7 @@
   <p:timing>
     <p:tnLst>
       <p:par>
-        <p:cTn id="1" dur="indefinite" restart="never" nodeType="tmRoot"/>
+        <p:cTn xmlns:p14="http://schemas.microsoft.com/office/powerpoint/2010/main" id="1" dur="indefinite" restart="never" nodeType="tmRoot"/>
       </p:par>
     </p:tnLst>
   </p:timing>
@@ -16618,7 +16546,11 @@
             <a:pPr algn="ctr"/>
             <a:r>
               <a:rPr lang="en-US" sz="2800" b="1" dirty="0" smtClean="0"/>
-              <a:t>Make New Variables</a:t>
+              <a:t>Make New </a:t>
+            </a:r>
+            <a:r>
+              <a:rPr lang="en-US" sz="2800" b="1" dirty="0" smtClean="0"/>
+              <a:t>Columns</a:t>
             </a:r>
             <a:endParaRPr lang="en-US" sz="2683" dirty="0"/>
           </a:p>
@@ -16700,7 +16632,13 @@
               <a:rPr lang="en-US" sz="1200" b="1" dirty="0" smtClean="0">
                 <a:latin typeface="Consolas" panose="020B0609020204030204" pitchFamily="49" charset="0"/>
               </a:rPr>
-              <a:t>['Length'].</a:t>
+              <a:t>['w'</a:t>
+            </a:r>
+            <a:r>
+              <a:rPr lang="en-US" sz="1200" b="1" dirty="0" smtClean="0">
+                <a:latin typeface="Consolas" panose="020B0609020204030204" pitchFamily="49" charset="0"/>
+              </a:rPr>
+              <a:t>].</a:t>
             </a:r>
             <a:r>
               <a:rPr lang="en-US" sz="1200" b="1" dirty="0" err="1" smtClean="0">
@@ -16764,29 +16702,38 @@
           </a:p>
           <a:p>
             <a:r>
-              <a:rPr lang="en-US" sz="1200" b="1" dirty="0" err="1">
-                <a:latin typeface="Consolas" panose="020B0609020204030204" pitchFamily="49" charset="0"/>
-              </a:rPr>
-              <a:t>len</a:t>
+              <a:rPr lang="en-US" sz="1200" b="1" dirty="0" err="1" smtClean="0">
+                <a:latin typeface="Consolas" panose="020B0609020204030204" pitchFamily="49" charset="0"/>
+              </a:rPr>
+              <a:t>df</a:t>
             </a:r>
             <a:r>
               <a:rPr lang="en-US" sz="1200" b="1" dirty="0">
                 <a:latin typeface="Consolas" panose="020B0609020204030204" pitchFamily="49" charset="0"/>
               </a:rPr>
-              <a:t>(</a:t>
-            </a:r>
-            <a:r>
-              <a:rPr lang="en-US" sz="1200" b="1" dirty="0" err="1">
-                <a:latin typeface="Consolas" panose="020B0609020204030204" pitchFamily="49" charset="0"/>
-              </a:rPr>
-              <a:t>df</a:t>
-            </a:r>
-            <a:r>
-              <a:rPr lang="en-US" sz="1200" b="1" dirty="0">
-                <a:latin typeface="Consolas" panose="020B0609020204030204" pitchFamily="49" charset="0"/>
-              </a:rPr>
-              <a:t>['w'].unique())</a:t>
-            </a:r>
+              <a:t>['w']</a:t>
+            </a:r>
+            <a:r>
+              <a:rPr lang="en-US" sz="1200" b="1" dirty="0" smtClean="0">
+                <a:latin typeface="Consolas" panose="020B0609020204030204" pitchFamily="49" charset="0"/>
+              </a:rPr>
+              <a:t>.</a:t>
+            </a:r>
+            <a:r>
+              <a:rPr lang="en-US" sz="1200" b="1" dirty="0" err="1" smtClean="0">
+                <a:latin typeface="Consolas" panose="020B0609020204030204" pitchFamily="49" charset="0"/>
+              </a:rPr>
+              <a:t>nunique</a:t>
+            </a:r>
+            <a:r>
+              <a:rPr lang="en-US" sz="1200" b="1" dirty="0" smtClean="0">
+                <a:latin typeface="Consolas" panose="020B0609020204030204" pitchFamily="49" charset="0"/>
+              </a:rPr>
+              <a:t>()</a:t>
+            </a:r>
+            <a:endParaRPr lang="en-US" sz="1200" b="1" dirty="0">
+              <a:latin typeface="Consolas" panose="020B0609020204030204" pitchFamily="49" charset="0"/>
+            </a:endParaRPr>
           </a:p>
           <a:p>
             <a:pPr marL="109538"/>
@@ -18576,18 +18523,6 @@
           </a:bodyPr>
           <a:lstStyle/>
           <a:p>
-            <a:r>
-              <a:rPr lang="en-US" sz="1200" b="1" dirty="0" err="1" smtClean="0">
-                <a:latin typeface="Consolas" panose="020B0609020204030204" pitchFamily="49" charset="0"/>
-              </a:rPr>
-              <a:t>df</a:t>
-            </a:r>
-            <a:r>
-              <a:rPr lang="en-US" sz="1200" b="1" dirty="0" smtClean="0">
-                <a:latin typeface="Consolas" panose="020B0609020204030204" pitchFamily="49" charset="0"/>
-              </a:rPr>
-              <a:t>=</a:t>
-            </a:r>
             <a:r>
               <a:rPr lang="en-US" sz="1200" b="1" dirty="0" err="1" smtClean="0">
                 <a:latin typeface="Consolas" panose="020B0609020204030204" pitchFamily="49" charset="0"/>
@@ -25600,7 +25535,19 @@
               <a:rPr lang="en-US" sz="1200" b="1" dirty="0" smtClean="0">
                 <a:latin typeface="Consolas" panose="020B0609020204030204" pitchFamily="49" charset="0"/>
               </a:rPr>
-              <a:t>clip(lower=-10,upper=10)</a:t>
+              <a:t>clip(lower=-10</a:t>
+            </a:r>
+            <a:r>
+              <a:rPr lang="en-US" sz="1200" b="1" dirty="0" smtClean="0">
+                <a:latin typeface="Consolas" panose="020B0609020204030204" pitchFamily="49" charset="0"/>
+              </a:rPr>
+              <a:t>,upper</a:t>
+            </a:r>
+            <a:r>
+              <a:rPr lang="en-US" sz="1200" b="1" dirty="0" smtClean="0">
+                <a:latin typeface="Consolas" panose="020B0609020204030204" pitchFamily="49" charset="0"/>
+              </a:rPr>
+              <a:t>=10)</a:t>
             </a:r>
             <a:endParaRPr lang="en-US" sz="1200" b="1" dirty="0">
               <a:latin typeface="Consolas" panose="020B0609020204030204" pitchFamily="49" charset="0"/>
@@ -26024,18 +25971,6 @@
               <a:rPr lang="en-US" sz="1200" b="1" dirty="0" err="1" smtClean="0">
                 <a:latin typeface="Consolas" panose="020B0609020204030204" pitchFamily="49" charset="0"/>
               </a:rPr>
-              <a:t>df</a:t>
-            </a:r>
-            <a:r>
-              <a:rPr lang="en-US" sz="1200" b="1" dirty="0" smtClean="0">
-                <a:latin typeface="Consolas" panose="020B0609020204030204" pitchFamily="49" charset="0"/>
-              </a:rPr>
-              <a:t>=</a:t>
-            </a:r>
-            <a:r>
-              <a:rPr lang="en-US" sz="1200" b="1" dirty="0" err="1" smtClean="0">
-                <a:latin typeface="Consolas" panose="020B0609020204030204" pitchFamily="49" charset="0"/>
-              </a:rPr>
               <a:t>df.dropna</a:t>
             </a:r>
             <a:r>
@@ -26059,18 +25994,6 @@
             </a:r>
           </a:p>
           <a:p>
-            <a:r>
-              <a:rPr lang="en-US" sz="1200" b="1" dirty="0" err="1" smtClean="0">
-                <a:latin typeface="Consolas" panose="020B0609020204030204" pitchFamily="49" charset="0"/>
-              </a:rPr>
-              <a:t>df</a:t>
-            </a:r>
-            <a:r>
-              <a:rPr lang="en-US" sz="1200" b="1" dirty="0" smtClean="0">
-                <a:latin typeface="Consolas" panose="020B0609020204030204" pitchFamily="49" charset="0"/>
-              </a:rPr>
-              <a:t>=</a:t>
-            </a:r>
             <a:r>
               <a:rPr lang="en-US" sz="1200" b="1" dirty="0" err="1" smtClean="0">
                 <a:latin typeface="Consolas" panose="020B0609020204030204" pitchFamily="49" charset="0"/>
@@ -26476,7 +26399,7 @@
     </a:clrScheme>
     <a:fontScheme name="Office Theme">
       <a:majorFont>
-        <a:latin typeface="Calibri Light" panose="020F0302020204030204"/>
+        <a:latin typeface="Calibri Light"/>
         <a:ea typeface=""/>
         <a:cs typeface=""/>
         <a:font script="Jpan" typeface="ＭＳ Ｐゴシック"/>
@@ -26511,7 +26434,7 @@
         <a:font script="Geor" typeface="Sylfaen"/>
       </a:majorFont>
       <a:minorFont>
-        <a:latin typeface="Calibri" panose="020F0502020204030204"/>
+        <a:latin typeface="Calibri"/>
         <a:ea typeface=""/>
         <a:cs typeface=""/>
         <a:font script="Jpan" typeface="ＭＳ Ｐゴシック"/>
@@ -26688,7 +26611,7 @@
   <a:extraClrSchemeLst/>
   <a:extLst>
     <a:ext uri="{05A4C25C-085E-4340-85A3-A5531E510DB2}">
-      <thm15:themeFamily xmlns:thm15="http://schemas.microsoft.com/office/thememl/2012/main" name="Office Theme" id="{62F939B6-93AF-4DB8-9C6B-D6C7DFDC589F}" vid="{4A3C46E8-61CC-4603-A589-7422A47A8E4A}"/>
+      <thm15:themeFamily xmlns:thm15="http://schemas.microsoft.com/office/thememl/2012/main" xmlns="" name="Office Theme" id="{62F939B6-93AF-4DB8-9C6B-D6C7DFDC589F}" vid="{4A3C46E8-61CC-4603-A589-7422A47A8E4A}"/>
     </a:ext>
   </a:extLst>
 </a:theme>

</xml_diff>

<commit_message>
(Closes #25029) Removed extra bracket from cheatsheet code example. (#25032)
</commit_message>
<xml_diff>
--- a/doc/cheatsheet/Pandas_Cheat_Sheet.pptx
+++ b/doc/cheatsheet/Pandas_Cheat_Sheet.pptx
@@ -255,7 +255,7 @@
           <a:p>
             <a:fld id="{79278B33-2949-49BE-B3B0-3F16CAF906FE}" type="datetimeFigureOut">
               <a:rPr lang="en-US" smtClean="0"/>
-              <a:t>3/15/2018</a:t>
+              <a:t>1/30/2019</a:t>
             </a:fld>
             <a:endParaRPr lang="en-US"/>
           </a:p>
@@ -425,7 +425,7 @@
           <a:p>
             <a:fld id="{79278B33-2949-49BE-B3B0-3F16CAF906FE}" type="datetimeFigureOut">
               <a:rPr lang="en-US" smtClean="0"/>
-              <a:t>3/15/2018</a:t>
+              <a:t>1/30/2019</a:t>
             </a:fld>
             <a:endParaRPr lang="en-US"/>
           </a:p>
@@ -605,7 +605,7 @@
           <a:p>
             <a:fld id="{79278B33-2949-49BE-B3B0-3F16CAF906FE}" type="datetimeFigureOut">
               <a:rPr lang="en-US" smtClean="0"/>
-              <a:t>3/15/2018</a:t>
+              <a:t>1/30/2019</a:t>
             </a:fld>
             <a:endParaRPr lang="en-US"/>
           </a:p>
@@ -775,7 +775,7 @@
           <a:p>
             <a:fld id="{79278B33-2949-49BE-B3B0-3F16CAF906FE}" type="datetimeFigureOut">
               <a:rPr lang="en-US" smtClean="0"/>
-              <a:t>3/15/2018</a:t>
+              <a:t>1/30/2019</a:t>
             </a:fld>
             <a:endParaRPr lang="en-US"/>
           </a:p>
@@ -1019,7 +1019,7 @@
           <a:p>
             <a:fld id="{79278B33-2949-49BE-B3B0-3F16CAF906FE}" type="datetimeFigureOut">
               <a:rPr lang="en-US" smtClean="0"/>
-              <a:t>3/15/2018</a:t>
+              <a:t>1/30/2019</a:t>
             </a:fld>
             <a:endParaRPr lang="en-US"/>
           </a:p>
@@ -1251,7 +1251,7 @@
           <a:p>
             <a:fld id="{79278B33-2949-49BE-B3B0-3F16CAF906FE}" type="datetimeFigureOut">
               <a:rPr lang="en-US" smtClean="0"/>
-              <a:t>3/15/2018</a:t>
+              <a:t>1/30/2019</a:t>
             </a:fld>
             <a:endParaRPr lang="en-US"/>
           </a:p>
@@ -1618,7 +1618,7 @@
           <a:p>
             <a:fld id="{79278B33-2949-49BE-B3B0-3F16CAF906FE}" type="datetimeFigureOut">
               <a:rPr lang="en-US" smtClean="0"/>
-              <a:t>3/15/2018</a:t>
+              <a:t>1/30/2019</a:t>
             </a:fld>
             <a:endParaRPr lang="en-US"/>
           </a:p>
@@ -1736,7 +1736,7 @@
           <a:p>
             <a:fld id="{79278B33-2949-49BE-B3B0-3F16CAF906FE}" type="datetimeFigureOut">
               <a:rPr lang="en-US" smtClean="0"/>
-              <a:t>3/15/2018</a:t>
+              <a:t>1/30/2019</a:t>
             </a:fld>
             <a:endParaRPr lang="en-US"/>
           </a:p>
@@ -1831,7 +1831,7 @@
           <a:p>
             <a:fld id="{79278B33-2949-49BE-B3B0-3F16CAF906FE}" type="datetimeFigureOut">
               <a:rPr lang="en-US" smtClean="0"/>
-              <a:t>3/15/2018</a:t>
+              <a:t>1/30/2019</a:t>
             </a:fld>
             <a:endParaRPr lang="en-US"/>
           </a:p>
@@ -2108,7 +2108,7 @@
           <a:p>
             <a:fld id="{79278B33-2949-49BE-B3B0-3F16CAF906FE}" type="datetimeFigureOut">
               <a:rPr lang="en-US" smtClean="0"/>
-              <a:t>3/15/2018</a:t>
+              <a:t>1/30/2019</a:t>
             </a:fld>
             <a:endParaRPr lang="en-US"/>
           </a:p>
@@ -2365,7 +2365,7 @@
           <a:p>
             <a:fld id="{79278B33-2949-49BE-B3B0-3F16CAF906FE}" type="datetimeFigureOut">
               <a:rPr lang="en-US" smtClean="0"/>
-              <a:t>3/15/2018</a:t>
+              <a:t>1/30/2019</a:t>
             </a:fld>
             <a:endParaRPr lang="en-US"/>
           </a:p>
@@ -2578,7 +2578,7 @@
           <a:p>
             <a:fld id="{79278B33-2949-49BE-B3B0-3F16CAF906FE}" type="datetimeFigureOut">
               <a:rPr lang="en-US" smtClean="0"/>
-              <a:t>3/15/2018</a:t>
+              <a:t>1/30/2019</a:t>
             </a:fld>
             <a:endParaRPr lang="en-US"/>
           </a:p>
@@ -11332,14 +11332,14 @@
           <a:effectLst/>
           <a:extLst>
             <a:ext uri="{909E8E84-426E-40dd-AFC4-6F175D3DCCD1}">
-              <a14:hiddenFill xmlns:a14="http://schemas.microsoft.com/office/drawing/2010/main" xmlns="">
+              <a14:hiddenFill xmlns="" xmlns:a14="http://schemas.microsoft.com/office/drawing/2010/main">
                 <a:solidFill>
                   <a:schemeClr val="accent1"/>
                 </a:solidFill>
               </a14:hiddenFill>
             </a:ext>
             <a:ext uri="{91240B29-F687-4f45-9708-019B960494DF}">
-              <a14:hiddenLine xmlns:a14="http://schemas.microsoft.com/office/drawing/2010/main" xmlns="" w="9525">
+              <a14:hiddenLine xmlns="" xmlns:a14="http://schemas.microsoft.com/office/drawing/2010/main" w="9525">
                 <a:solidFill>
                   <a:schemeClr val="tx1"/>
                 </a:solidFill>
@@ -11349,7 +11349,7 @@
               </a14:hiddenLine>
             </a:ext>
             <a:ext uri="{AF507438-7753-43e0-B8FC-AC1667EBCBE1}">
-              <a14:hiddenEffects xmlns:a14="http://schemas.microsoft.com/office/drawing/2010/main" xmlns="">
+              <a14:hiddenEffects xmlns="" xmlns:a14="http://schemas.microsoft.com/office/drawing/2010/main">
                 <a:effectLst>
                   <a:outerShdw dist="35921" dir="2700000" algn="ctr" rotWithShape="0">
                     <a:schemeClr val="bg2"/>
@@ -11514,11 +11514,14 @@
               <a:t>n','v</a:t>
             </a:r>
             <a:r>
-              <a:rPr lang="en-US" sz="1200" b="1" dirty="0">
-                <a:latin typeface="Consolas" panose="020B0609020204030204" pitchFamily="49" charset="0"/>
-              </a:rPr>
-              <a:t>'])))</a:t>
-            </a:r>
+              <a:rPr lang="en-US" sz="1200" b="1">
+                <a:latin typeface="Consolas" panose="020B0609020204030204" pitchFamily="49" charset="0"/>
+              </a:rPr>
+              <a:t>']))</a:t>
+            </a:r>
+            <a:endParaRPr lang="en-US" sz="1200" b="1" dirty="0">
+              <a:latin typeface="Consolas" panose="020B0609020204030204" pitchFamily="49" charset="0"/>
+            </a:endParaRPr>
           </a:p>
           <a:p>
             <a:r>

</xml_diff>

<commit_message>
Fix typo in Cheat sheet with regex (#25215)
</commit_message>
<xml_diff>
--- a/doc/cheatsheet/Pandas_Cheat_Sheet.pptx
+++ b/doc/cheatsheet/Pandas_Cheat_Sheet.pptx
@@ -255,7 +255,7 @@
           <a:p>
             <a:fld id="{79278B33-2949-49BE-B3B0-3F16CAF906FE}" type="datetimeFigureOut">
               <a:rPr lang="en-US" smtClean="0"/>
-              <a:t>1/30/2019</a:t>
+              <a:t>2/11/2019</a:t>
             </a:fld>
             <a:endParaRPr lang="en-US"/>
           </a:p>
@@ -425,7 +425,7 @@
           <a:p>
             <a:fld id="{79278B33-2949-49BE-B3B0-3F16CAF906FE}" type="datetimeFigureOut">
               <a:rPr lang="en-US" smtClean="0"/>
-              <a:t>1/30/2019</a:t>
+              <a:t>2/11/2019</a:t>
             </a:fld>
             <a:endParaRPr lang="en-US"/>
           </a:p>
@@ -605,7 +605,7 @@
           <a:p>
             <a:fld id="{79278B33-2949-49BE-B3B0-3F16CAF906FE}" type="datetimeFigureOut">
               <a:rPr lang="en-US" smtClean="0"/>
-              <a:t>1/30/2019</a:t>
+              <a:t>2/11/2019</a:t>
             </a:fld>
             <a:endParaRPr lang="en-US"/>
           </a:p>
@@ -775,7 +775,7 @@
           <a:p>
             <a:fld id="{79278B33-2949-49BE-B3B0-3F16CAF906FE}" type="datetimeFigureOut">
               <a:rPr lang="en-US" smtClean="0"/>
-              <a:t>1/30/2019</a:t>
+              <a:t>2/11/2019</a:t>
             </a:fld>
             <a:endParaRPr lang="en-US"/>
           </a:p>
@@ -1019,7 +1019,7 @@
           <a:p>
             <a:fld id="{79278B33-2949-49BE-B3B0-3F16CAF906FE}" type="datetimeFigureOut">
               <a:rPr lang="en-US" smtClean="0"/>
-              <a:t>1/30/2019</a:t>
+              <a:t>2/11/2019</a:t>
             </a:fld>
             <a:endParaRPr lang="en-US"/>
           </a:p>
@@ -1251,7 +1251,7 @@
           <a:p>
             <a:fld id="{79278B33-2949-49BE-B3B0-3F16CAF906FE}" type="datetimeFigureOut">
               <a:rPr lang="en-US" smtClean="0"/>
-              <a:t>1/30/2019</a:t>
+              <a:t>2/11/2019</a:t>
             </a:fld>
             <a:endParaRPr lang="en-US"/>
           </a:p>
@@ -1618,7 +1618,7 @@
           <a:p>
             <a:fld id="{79278B33-2949-49BE-B3B0-3F16CAF906FE}" type="datetimeFigureOut">
               <a:rPr lang="en-US" smtClean="0"/>
-              <a:t>1/30/2019</a:t>
+              <a:t>2/11/2019</a:t>
             </a:fld>
             <a:endParaRPr lang="en-US"/>
           </a:p>
@@ -1736,7 +1736,7 @@
           <a:p>
             <a:fld id="{79278B33-2949-49BE-B3B0-3F16CAF906FE}" type="datetimeFigureOut">
               <a:rPr lang="en-US" smtClean="0"/>
-              <a:t>1/30/2019</a:t>
+              <a:t>2/11/2019</a:t>
             </a:fld>
             <a:endParaRPr lang="en-US"/>
           </a:p>
@@ -1831,7 +1831,7 @@
           <a:p>
             <a:fld id="{79278B33-2949-49BE-B3B0-3F16CAF906FE}" type="datetimeFigureOut">
               <a:rPr lang="en-US" smtClean="0"/>
-              <a:t>1/30/2019</a:t>
+              <a:t>2/11/2019</a:t>
             </a:fld>
             <a:endParaRPr lang="en-US"/>
           </a:p>
@@ -2108,7 +2108,7 @@
           <a:p>
             <a:fld id="{79278B33-2949-49BE-B3B0-3F16CAF906FE}" type="datetimeFigureOut">
               <a:rPr lang="en-US" smtClean="0"/>
-              <a:t>1/30/2019</a:t>
+              <a:t>2/11/2019</a:t>
             </a:fld>
             <a:endParaRPr lang="en-US"/>
           </a:p>
@@ -2365,7 +2365,7 @@
           <a:p>
             <a:fld id="{79278B33-2949-49BE-B3B0-3F16CAF906FE}" type="datetimeFigureOut">
               <a:rPr lang="en-US" smtClean="0"/>
-              <a:t>1/30/2019</a:t>
+              <a:t>2/11/2019</a:t>
             </a:fld>
             <a:endParaRPr lang="en-US"/>
           </a:p>
@@ -2578,7 +2578,7 @@
           <a:p>
             <a:fld id="{79278B33-2949-49BE-B3B0-3F16CAF906FE}" type="datetimeFigureOut">
               <a:rPr lang="en-US" smtClean="0"/>
-              <a:t>1/30/2019</a:t>
+              <a:t>2/11/2019</a:t>
             </a:fld>
             <a:endParaRPr lang="en-US"/>
           </a:p>
@@ -11332,14 +11332,14 @@
           <a:effectLst/>
           <a:extLst>
             <a:ext uri="{909E8E84-426E-40dd-AFC4-6F175D3DCCD1}">
-              <a14:hiddenFill xmlns="" xmlns:a14="http://schemas.microsoft.com/office/drawing/2010/main">
+              <a14:hiddenFill xmlns:a14="http://schemas.microsoft.com/office/drawing/2010/main" xmlns="">
                 <a:solidFill>
                   <a:schemeClr val="accent1"/>
                 </a:solidFill>
               </a14:hiddenFill>
             </a:ext>
             <a:ext uri="{91240B29-F687-4f45-9708-019B960494DF}">
-              <a14:hiddenLine xmlns="" xmlns:a14="http://schemas.microsoft.com/office/drawing/2010/main" w="9525">
+              <a14:hiddenLine xmlns:a14="http://schemas.microsoft.com/office/drawing/2010/main" xmlns="" w="9525">
                 <a:solidFill>
                   <a:schemeClr val="tx1"/>
                 </a:solidFill>
@@ -11349,7 +11349,7 @@
               </a14:hiddenLine>
             </a:ext>
             <a:ext uri="{AF507438-7753-43e0-B8FC-AC1667EBCBE1}">
-              <a14:hiddenEffects xmlns="" xmlns:a14="http://schemas.microsoft.com/office/drawing/2010/main">
+              <a14:hiddenEffects xmlns:a14="http://schemas.microsoft.com/office/drawing/2010/main" xmlns="">
                 <a:effectLst>
                   <a:outerShdw dist="35921" dir="2700000" algn="ctr" rotWithShape="0">
                     <a:schemeClr val="bg2"/>
@@ -15669,7 +15669,7 @@
           <p:nvPr>
             <p:extLst>
               <p:ext uri="{D42A27DB-BD31-4B8C-83A1-F6EECF244321}">
-                <p14:modId xmlns:p14="http://schemas.microsoft.com/office/powerpoint/2010/main" val="1269780901"/>
+                <p14:modId xmlns:p14="http://schemas.microsoft.com/office/powerpoint/2010/main" val="3616751061"/>
               </p:ext>
             </p:extLst>
           </p:nvPr>
@@ -16299,10 +16299,16 @@
                     <a:lstStyle/>
                     <a:p>
                       <a:r>
+                        <a:rPr lang="en-US" sz="900" b="1">
+                          <a:latin typeface="Consolas" panose="020B0609020204030204" pitchFamily="49" charset="0"/>
+                        </a:rPr>
+                        <a:t>'^(?!</a:t>
+                      </a:r>
+                      <a:r>
                         <a:rPr lang="en-US" sz="900" b="1" dirty="0">
                           <a:latin typeface="Consolas" panose="020B0609020204030204" pitchFamily="49" charset="0"/>
                         </a:rPr>
-                        <a:t>''^(?!Species$).*'</a:t>
+                        <a:t>Species$).*'</a:t>
                       </a:r>
                     </a:p>
                   </a:txBody>

</xml_diff>

<commit_message>
DOC: added more and updated links in cheat sheet (#39748)
* Added links to official docs in cheat sheets

* DOC: added links to official docs in cheat sheet (update)
</commit_message>
<xml_diff>
--- a/doc/cheatsheet/Pandas_Cheat_Sheet.pptx
+++ b/doc/cheatsheet/Pandas_Cheat_Sheet.pptx
@@ -255,7 +255,7 @@
           <a:p>
             <a:fld id="{79278B33-2949-49BE-B3B0-3F16CAF906FE}" type="datetimeFigureOut">
               <a:rPr lang="en-US" smtClean="0"/>
-              <a:t>2/11/2019</a:t>
+              <a:t>2/9/2021</a:t>
             </a:fld>
             <a:endParaRPr lang="en-US"/>
           </a:p>
@@ -297,7 +297,7 @@
           <a:p>
             <a:fld id="{E8285EFA-DD28-4E69-ADE7-169C8C1119D8}" type="slidenum">
               <a:rPr lang="en-US" smtClean="0"/>
-              <a:t>‹#›</a:t>
+              <a:t>‹Nr.›</a:t>
             </a:fld>
             <a:endParaRPr lang="en-US"/>
           </a:p>
@@ -425,7 +425,7 @@
           <a:p>
             <a:fld id="{79278B33-2949-49BE-B3B0-3F16CAF906FE}" type="datetimeFigureOut">
               <a:rPr lang="en-US" smtClean="0"/>
-              <a:t>2/11/2019</a:t>
+              <a:t>2/9/2021</a:t>
             </a:fld>
             <a:endParaRPr lang="en-US"/>
           </a:p>
@@ -467,7 +467,7 @@
           <a:p>
             <a:fld id="{E8285EFA-DD28-4E69-ADE7-169C8C1119D8}" type="slidenum">
               <a:rPr lang="en-US" smtClean="0"/>
-              <a:t>‹#›</a:t>
+              <a:t>‹Nr.›</a:t>
             </a:fld>
             <a:endParaRPr lang="en-US"/>
           </a:p>
@@ -605,7 +605,7 @@
           <a:p>
             <a:fld id="{79278B33-2949-49BE-B3B0-3F16CAF906FE}" type="datetimeFigureOut">
               <a:rPr lang="en-US" smtClean="0"/>
-              <a:t>2/11/2019</a:t>
+              <a:t>2/9/2021</a:t>
             </a:fld>
             <a:endParaRPr lang="en-US"/>
           </a:p>
@@ -647,7 +647,7 @@
           <a:p>
             <a:fld id="{E8285EFA-DD28-4E69-ADE7-169C8C1119D8}" type="slidenum">
               <a:rPr lang="en-US" smtClean="0"/>
-              <a:t>‹#›</a:t>
+              <a:t>‹Nr.›</a:t>
             </a:fld>
             <a:endParaRPr lang="en-US"/>
           </a:p>
@@ -775,7 +775,7 @@
           <a:p>
             <a:fld id="{79278B33-2949-49BE-B3B0-3F16CAF906FE}" type="datetimeFigureOut">
               <a:rPr lang="en-US" smtClean="0"/>
-              <a:t>2/11/2019</a:t>
+              <a:t>2/9/2021</a:t>
             </a:fld>
             <a:endParaRPr lang="en-US"/>
           </a:p>
@@ -817,7 +817,7 @@
           <a:p>
             <a:fld id="{E8285EFA-DD28-4E69-ADE7-169C8C1119D8}" type="slidenum">
               <a:rPr lang="en-US" smtClean="0"/>
-              <a:t>‹#›</a:t>
+              <a:t>‹Nr.›</a:t>
             </a:fld>
             <a:endParaRPr lang="en-US"/>
           </a:p>
@@ -1019,7 +1019,7 @@
           <a:p>
             <a:fld id="{79278B33-2949-49BE-B3B0-3F16CAF906FE}" type="datetimeFigureOut">
               <a:rPr lang="en-US" smtClean="0"/>
-              <a:t>2/11/2019</a:t>
+              <a:t>2/9/2021</a:t>
             </a:fld>
             <a:endParaRPr lang="en-US"/>
           </a:p>
@@ -1061,7 +1061,7 @@
           <a:p>
             <a:fld id="{E8285EFA-DD28-4E69-ADE7-169C8C1119D8}" type="slidenum">
               <a:rPr lang="en-US" smtClean="0"/>
-              <a:t>‹#›</a:t>
+              <a:t>‹Nr.›</a:t>
             </a:fld>
             <a:endParaRPr lang="en-US"/>
           </a:p>
@@ -1251,7 +1251,7 @@
           <a:p>
             <a:fld id="{79278B33-2949-49BE-B3B0-3F16CAF906FE}" type="datetimeFigureOut">
               <a:rPr lang="en-US" smtClean="0"/>
-              <a:t>2/11/2019</a:t>
+              <a:t>2/9/2021</a:t>
             </a:fld>
             <a:endParaRPr lang="en-US"/>
           </a:p>
@@ -1293,7 +1293,7 @@
           <a:p>
             <a:fld id="{E8285EFA-DD28-4E69-ADE7-169C8C1119D8}" type="slidenum">
               <a:rPr lang="en-US" smtClean="0"/>
-              <a:t>‹#›</a:t>
+              <a:t>‹Nr.›</a:t>
             </a:fld>
             <a:endParaRPr lang="en-US"/>
           </a:p>
@@ -1618,7 +1618,7 @@
           <a:p>
             <a:fld id="{79278B33-2949-49BE-B3B0-3F16CAF906FE}" type="datetimeFigureOut">
               <a:rPr lang="en-US" smtClean="0"/>
-              <a:t>2/11/2019</a:t>
+              <a:t>2/9/2021</a:t>
             </a:fld>
             <a:endParaRPr lang="en-US"/>
           </a:p>
@@ -1660,7 +1660,7 @@
           <a:p>
             <a:fld id="{E8285EFA-DD28-4E69-ADE7-169C8C1119D8}" type="slidenum">
               <a:rPr lang="en-US" smtClean="0"/>
-              <a:t>‹#›</a:t>
+              <a:t>‹Nr.›</a:t>
             </a:fld>
             <a:endParaRPr lang="en-US"/>
           </a:p>
@@ -1736,7 +1736,7 @@
           <a:p>
             <a:fld id="{79278B33-2949-49BE-B3B0-3F16CAF906FE}" type="datetimeFigureOut">
               <a:rPr lang="en-US" smtClean="0"/>
-              <a:t>2/11/2019</a:t>
+              <a:t>2/9/2021</a:t>
             </a:fld>
             <a:endParaRPr lang="en-US"/>
           </a:p>
@@ -1778,7 +1778,7 @@
           <a:p>
             <a:fld id="{E8285EFA-DD28-4E69-ADE7-169C8C1119D8}" type="slidenum">
               <a:rPr lang="en-US" smtClean="0"/>
-              <a:t>‹#›</a:t>
+              <a:t>‹Nr.›</a:t>
             </a:fld>
             <a:endParaRPr lang="en-US"/>
           </a:p>
@@ -1831,7 +1831,7 @@
           <a:p>
             <a:fld id="{79278B33-2949-49BE-B3B0-3F16CAF906FE}" type="datetimeFigureOut">
               <a:rPr lang="en-US" smtClean="0"/>
-              <a:t>2/11/2019</a:t>
+              <a:t>2/9/2021</a:t>
             </a:fld>
             <a:endParaRPr lang="en-US"/>
           </a:p>
@@ -1873,7 +1873,7 @@
           <a:p>
             <a:fld id="{E8285EFA-DD28-4E69-ADE7-169C8C1119D8}" type="slidenum">
               <a:rPr lang="en-US" smtClean="0"/>
-              <a:t>‹#›</a:t>
+              <a:t>‹Nr.›</a:t>
             </a:fld>
             <a:endParaRPr lang="en-US"/>
           </a:p>
@@ -2108,7 +2108,7 @@
           <a:p>
             <a:fld id="{79278B33-2949-49BE-B3B0-3F16CAF906FE}" type="datetimeFigureOut">
               <a:rPr lang="en-US" smtClean="0"/>
-              <a:t>2/11/2019</a:t>
+              <a:t>2/9/2021</a:t>
             </a:fld>
             <a:endParaRPr lang="en-US"/>
           </a:p>
@@ -2150,7 +2150,7 @@
           <a:p>
             <a:fld id="{E8285EFA-DD28-4E69-ADE7-169C8C1119D8}" type="slidenum">
               <a:rPr lang="en-US" smtClean="0"/>
-              <a:t>‹#›</a:t>
+              <a:t>‹Nr.›</a:t>
             </a:fld>
             <a:endParaRPr lang="en-US"/>
           </a:p>
@@ -2365,7 +2365,7 @@
           <a:p>
             <a:fld id="{79278B33-2949-49BE-B3B0-3F16CAF906FE}" type="datetimeFigureOut">
               <a:rPr lang="en-US" smtClean="0"/>
-              <a:t>2/11/2019</a:t>
+              <a:t>2/9/2021</a:t>
             </a:fld>
             <a:endParaRPr lang="en-US"/>
           </a:p>
@@ -2407,7 +2407,7 @@
           <a:p>
             <a:fld id="{E8285EFA-DD28-4E69-ADE7-169C8C1119D8}" type="slidenum">
               <a:rPr lang="en-US" smtClean="0"/>
-              <a:t>‹#›</a:t>
+              <a:t>‹Nr.›</a:t>
             </a:fld>
             <a:endParaRPr lang="en-US"/>
           </a:p>
@@ -2578,7 +2578,7 @@
           <a:p>
             <a:fld id="{79278B33-2949-49BE-B3B0-3F16CAF906FE}" type="datetimeFigureOut">
               <a:rPr lang="en-US" smtClean="0"/>
-              <a:t>2/11/2019</a:t>
+              <a:t>2/9/2021</a:t>
             </a:fld>
             <a:endParaRPr lang="en-US"/>
           </a:p>
@@ -2656,7 +2656,7 @@
           <a:p>
             <a:fld id="{E8285EFA-DD28-4E69-ADE7-169C8C1119D8}" type="slidenum">
               <a:rPr lang="en-US" smtClean="0"/>
-              <a:t>‹#›</a:t>
+              <a:t>‹Nr.›</a:t>
             </a:fld>
             <a:endParaRPr lang="en-US"/>
           </a:p>
@@ -3388,22 +3388,70 @@
           <a:p>
             <a:pPr algn="ctr"/>
             <a:r>
-              <a:rPr lang="en-US" sz="2800" b="1" dirty="0"/>
+              <a:rPr lang="en-US" sz="2800" b="1" dirty="0">
+                <a:solidFill>
+                  <a:schemeClr val="bg1"/>
+                </a:solidFill>
+                <a:hlinkClick r:id="rId2">
+                  <a:extLst>
+                    <a:ext uri="{A12FA001-AC4F-418D-AE19-62706E023703}">
+                      <ahyp:hlinkClr xmlns:ahyp="http://schemas.microsoft.com/office/drawing/2018/hyperlinkcolor" val="tx"/>
+                    </a:ext>
+                  </a:extLst>
+                </a:hlinkClick>
+              </a:rPr>
               <a:t>Syntax</a:t>
             </a:r>
             <a:r>
-              <a:rPr lang="en-US" sz="2683" dirty="0"/>
+              <a:rPr lang="en-US" sz="2683" dirty="0">
+                <a:solidFill>
+                  <a:schemeClr val="bg1"/>
+                </a:solidFill>
+                <a:hlinkClick r:id="rId2">
+                  <a:extLst>
+                    <a:ext uri="{A12FA001-AC4F-418D-AE19-62706E023703}">
+                      <ahyp:hlinkClr xmlns:ahyp="http://schemas.microsoft.com/office/drawing/2018/hyperlinkcolor" val="tx"/>
+                    </a:ext>
+                  </a:extLst>
+                </a:hlinkClick>
+              </a:rPr>
               <a:t> </a:t>
             </a:r>
             <a:r>
-              <a:rPr lang="en-US" sz="1800" dirty="0"/>
+              <a:rPr lang="en-US" sz="1800" dirty="0">
+                <a:solidFill>
+                  <a:schemeClr val="bg1"/>
+                </a:solidFill>
+                <a:hlinkClick r:id="rId2">
+                  <a:extLst>
+                    <a:ext uri="{A12FA001-AC4F-418D-AE19-62706E023703}">
+                      <ahyp:hlinkClr xmlns:ahyp="http://schemas.microsoft.com/office/drawing/2018/hyperlinkcolor" val="tx"/>
+                    </a:ext>
+                  </a:extLst>
+                </a:hlinkClick>
+              </a:rPr>
               <a:t>– Creating </a:t>
             </a:r>
             <a:r>
-              <a:rPr lang="en-US" sz="1800" dirty="0" err="1"/>
+              <a:rPr lang="en-US" sz="1800" dirty="0" err="1">
+                <a:solidFill>
+                  <a:schemeClr val="bg1"/>
+                </a:solidFill>
+                <a:hlinkClick r:id="rId2">
+                  <a:extLst>
+                    <a:ext uri="{A12FA001-AC4F-418D-AE19-62706E023703}">
+                      <ahyp:hlinkClr xmlns:ahyp="http://schemas.microsoft.com/office/drawing/2018/hyperlinkcolor" val="tx"/>
+                    </a:ext>
+                  </a:extLst>
+                </a:hlinkClick>
+              </a:rPr>
               <a:t>DataFrames</a:t>
             </a:r>
-            <a:endParaRPr lang="en-US" sz="1800" dirty="0"/>
+            <a:endParaRPr lang="en-US" sz="1800" dirty="0">
+              <a:solidFill>
+                <a:schemeClr val="bg1"/>
+              </a:solidFill>
+            </a:endParaRPr>
           </a:p>
         </p:txBody>
       </p:sp>
@@ -4219,11 +4267,33 @@
           <a:p>
             <a:pPr algn="ctr"/>
             <a:r>
-              <a:rPr lang="en-US" sz="2800" b="1" dirty="0"/>
+              <a:rPr lang="en-US" sz="2800" b="1" dirty="0">
+                <a:solidFill>
+                  <a:schemeClr val="bg1"/>
+                </a:solidFill>
+                <a:hlinkClick r:id="rId3">
+                  <a:extLst>
+                    <a:ext uri="{A12FA001-AC4F-418D-AE19-62706E023703}">
+                      <ahyp:hlinkClr xmlns:ahyp="http://schemas.microsoft.com/office/drawing/2018/hyperlinkcolor" val="tx"/>
+                    </a:ext>
+                  </a:extLst>
+                </a:hlinkClick>
+              </a:rPr>
               <a:t>Reshaping Data</a:t>
             </a:r>
             <a:r>
-              <a:rPr lang="en-US" sz="2800" dirty="0"/>
+              <a:rPr lang="en-US" sz="2800" dirty="0">
+                <a:solidFill>
+                  <a:schemeClr val="bg1"/>
+                </a:solidFill>
+                <a:hlinkClick r:id="rId3">
+                  <a:extLst>
+                    <a:ext uri="{A12FA001-AC4F-418D-AE19-62706E023703}">
+                      <ahyp:hlinkClr xmlns:ahyp="http://schemas.microsoft.com/office/drawing/2018/hyperlinkcolor" val="tx"/>
+                    </a:ext>
+                  </a:extLst>
+                </a:hlinkClick>
+              </a:rPr>
               <a:t> </a:t>
             </a:r>
             <a:r>
@@ -5671,7 +5741,14 @@
               <a:rPr lang="en-US" sz="1200" b="1" dirty="0" err="1">
                 <a:latin typeface="Consolas" panose="020B0609020204030204" pitchFamily="49" charset="0"/>
               </a:rPr>
-              <a:t>pd.melt</a:t>
+              <a:t>pd.</a:t>
+            </a:r>
+            <a:r>
+              <a:rPr lang="en-US" sz="1200" b="1" dirty="0" err="1">
+                <a:latin typeface="Consolas" panose="020B0609020204030204" pitchFamily="49" charset="0"/>
+                <a:hlinkClick r:id="rId4"/>
+              </a:rPr>
+              <a:t>melt</a:t>
             </a:r>
             <a:r>
               <a:rPr lang="en-US" sz="1200" b="1" dirty="0">
@@ -6465,7 +6542,14 @@
               <a:rPr lang="en-US" sz="1200" b="1" dirty="0" err="1">
                 <a:latin typeface="Consolas" panose="020B0609020204030204" pitchFamily="49" charset="0"/>
               </a:rPr>
-              <a:t>df.pivot</a:t>
+              <a:t>df.</a:t>
+            </a:r>
+            <a:r>
+              <a:rPr lang="en-US" sz="1200" b="1" dirty="0" err="1">
+                <a:latin typeface="Consolas" panose="020B0609020204030204" pitchFamily="49" charset="0"/>
+                <a:hlinkClick r:id="rId5"/>
+              </a:rPr>
+              <a:t>pivot</a:t>
             </a:r>
             <a:r>
               <a:rPr lang="en-US" sz="1200" b="1" dirty="0">
@@ -7062,7 +7146,14 @@
               <a:rPr lang="en-US" sz="1200" b="1" dirty="0" err="1">
                 <a:latin typeface="Consolas" panose="020B0609020204030204" pitchFamily="49" charset="0"/>
               </a:rPr>
-              <a:t>pd.concat</a:t>
+              <a:t>pd.</a:t>
+            </a:r>
+            <a:r>
+              <a:rPr lang="en-US" sz="1200" b="1" dirty="0" err="1">
+                <a:latin typeface="Consolas" panose="020B0609020204030204" pitchFamily="49" charset="0"/>
+                <a:hlinkClick r:id="rId6"/>
+              </a:rPr>
+              <a:t>concat</a:t>
             </a:r>
             <a:r>
               <a:rPr lang="en-US" sz="1200" b="1" dirty="0">
@@ -8174,7 +8265,14 @@
               <a:rPr lang="en-US" sz="1200" b="1" dirty="0" err="1">
                 <a:latin typeface="Consolas" panose="020B0609020204030204" pitchFamily="49" charset="0"/>
               </a:rPr>
-              <a:t>pd.concat</a:t>
+              <a:t>pd.</a:t>
+            </a:r>
+            <a:r>
+              <a:rPr lang="en-US" sz="1200" b="1" dirty="0" err="1">
+                <a:latin typeface="Consolas" panose="020B0609020204030204" pitchFamily="49" charset="0"/>
+                <a:hlinkClick r:id="rId6"/>
+              </a:rPr>
+              <a:t>concat</a:t>
             </a:r>
             <a:r>
               <a:rPr lang="en-US" sz="1200" b="1" dirty="0">
@@ -8406,7 +8504,14 @@
               <a:rPr lang="en-US" sz="1200" b="1" dirty="0" err="1">
                 <a:latin typeface="Consolas" panose="020B0609020204030204" pitchFamily="49" charset="0"/>
               </a:rPr>
-              <a:t>df.sort_values</a:t>
+              <a:t>df.</a:t>
+            </a:r>
+            <a:r>
+              <a:rPr lang="en-US" sz="1200" b="1" dirty="0" err="1">
+                <a:latin typeface="Consolas" panose="020B0609020204030204" pitchFamily="49" charset="0"/>
+                <a:hlinkClick r:id="rId7"/>
+              </a:rPr>
+              <a:t>sort_values</a:t>
             </a:r>
             <a:r>
               <a:rPr lang="en-US" sz="1200" b="1" dirty="0">
@@ -8430,7 +8535,14 @@
               <a:rPr lang="en-US" sz="1200" b="1" dirty="0" err="1">
                 <a:latin typeface="Consolas" panose="020B0609020204030204" pitchFamily="49" charset="0"/>
               </a:rPr>
-              <a:t>df.sort_values</a:t>
+              <a:t>df.</a:t>
+            </a:r>
+            <a:r>
+              <a:rPr lang="en-US" sz="1200" b="1" dirty="0" err="1">
+                <a:latin typeface="Consolas" panose="020B0609020204030204" pitchFamily="49" charset="0"/>
+                <a:hlinkClick r:id="rId7"/>
+              </a:rPr>
+              <a:t>sort_values</a:t>
             </a:r>
             <a:r>
               <a:rPr lang="en-US" sz="1200" b="1" dirty="0">
@@ -8466,7 +8578,14 @@
               <a:rPr lang="en-US" sz="1200" b="1" dirty="0" err="1">
                 <a:latin typeface="Consolas" panose="020B0609020204030204" pitchFamily="49" charset="0"/>
               </a:rPr>
-              <a:t>df.rename</a:t>
+              <a:t>df.</a:t>
+            </a:r>
+            <a:r>
+              <a:rPr lang="en-US" sz="1200" b="1" dirty="0" err="1">
+                <a:latin typeface="Consolas" panose="020B0609020204030204" pitchFamily="49" charset="0"/>
+                <a:hlinkClick r:id="rId8"/>
+              </a:rPr>
+              <a:t>rename</a:t>
             </a:r>
             <a:r>
               <a:rPr lang="en-US" sz="1200" b="1" dirty="0">
@@ -8507,7 +8626,14 @@
               <a:rPr lang="en-US" sz="1200" b="1" dirty="0" err="1">
                 <a:latin typeface="Consolas" panose="020B0609020204030204" pitchFamily="49" charset="0"/>
               </a:rPr>
-              <a:t>df.sort_index</a:t>
+              <a:t>df.</a:t>
+            </a:r>
+            <a:r>
+              <a:rPr lang="en-US" sz="1200" b="1" dirty="0" err="1">
+                <a:latin typeface="Consolas" panose="020B0609020204030204" pitchFamily="49" charset="0"/>
+                <a:hlinkClick r:id="rId9"/>
+              </a:rPr>
+              <a:t>sort_index</a:t>
             </a:r>
             <a:r>
               <a:rPr lang="en-US" sz="1200" b="1" dirty="0">
@@ -8536,7 +8662,14 @@
               <a:rPr lang="en-US" sz="1200" b="1" dirty="0" err="1">
                 <a:latin typeface="Consolas" panose="020B0609020204030204" pitchFamily="49" charset="0"/>
               </a:rPr>
-              <a:t>df.reset_index</a:t>
+              <a:t>df.</a:t>
+            </a:r>
+            <a:r>
+              <a:rPr lang="en-US" sz="1200" b="1" dirty="0" err="1">
+                <a:latin typeface="Consolas" panose="020B0609020204030204" pitchFamily="49" charset="0"/>
+                <a:hlinkClick r:id="rId10"/>
+              </a:rPr>
+              <a:t>reset_index</a:t>
             </a:r>
             <a:r>
               <a:rPr lang="en-US" sz="1200" b="1" dirty="0">
@@ -8569,7 +8702,14 @@
               <a:rPr lang="en-US" sz="1200" b="1" dirty="0" err="1">
                 <a:latin typeface="Consolas" panose="020B0609020204030204" pitchFamily="49" charset="0"/>
               </a:rPr>
-              <a:t>df.drop</a:t>
+              <a:t>df.</a:t>
+            </a:r>
+            <a:r>
+              <a:rPr lang="en-US" sz="1200" b="1" dirty="0" err="1">
+                <a:latin typeface="Consolas" panose="020B0609020204030204" pitchFamily="49" charset="0"/>
+                <a:hlinkClick r:id="rId11"/>
+              </a:rPr>
+              <a:t>drop</a:t>
             </a:r>
             <a:r>
               <a:rPr lang="en-US" sz="1200" b="1" dirty="0">
@@ -8640,7 +8780,18 @@
           <a:p>
             <a:pPr algn="ctr"/>
             <a:r>
-              <a:rPr lang="en-US" sz="2800" b="1" dirty="0"/>
+              <a:rPr lang="en-US" sz="2800" b="1" dirty="0">
+                <a:solidFill>
+                  <a:schemeClr val="bg1"/>
+                </a:solidFill>
+                <a:hlinkClick r:id="rId12">
+                  <a:extLst>
+                    <a:ext uri="{A12FA001-AC4F-418D-AE19-62706E023703}">
+                      <ahyp:hlinkClr xmlns:ahyp="http://schemas.microsoft.com/office/drawing/2018/hyperlinkcolor" val="tx"/>
+                    </a:ext>
+                  </a:extLst>
+                </a:hlinkClick>
+              </a:rPr>
               <a:t>Subset Observations </a:t>
             </a:r>
             <a:r>
@@ -8688,7 +8839,18 @@
           <a:p>
             <a:pPr algn="ctr"/>
             <a:r>
-              <a:rPr lang="en-US" sz="2800" b="1" dirty="0"/>
+              <a:rPr lang="en-US" sz="2800" b="1" dirty="0">
+                <a:solidFill>
+                  <a:schemeClr val="bg1"/>
+                </a:solidFill>
+                <a:hlinkClick r:id="rId12">
+                  <a:extLst>
+                    <a:ext uri="{A12FA001-AC4F-418D-AE19-62706E023703}">
+                      <ahyp:hlinkClr xmlns:ahyp="http://schemas.microsoft.com/office/drawing/2018/hyperlinkcolor" val="tx"/>
+                    </a:ext>
+                  </a:extLst>
+                </a:hlinkClick>
+              </a:rPr>
               <a:t>Subset Variables </a:t>
             </a:r>
             <a:r>
@@ -9728,20 +9890,15 @@
           <a:lstStyle/>
           <a:p>
             <a:r>
+              <a:rPr lang="en-US" sz="1200" b="1" dirty="0">
+                <a:latin typeface="Consolas" panose="020B0609020204030204" pitchFamily="49" charset="0"/>
+              </a:rPr>
+              <a:t>df = </a:t>
+            </a:r>
+            <a:r>
               <a:rPr lang="en-US" sz="1200" b="1" dirty="0" err="1">
                 <a:latin typeface="Consolas" panose="020B0609020204030204" pitchFamily="49" charset="0"/>
-              </a:rPr>
-              <a:t>df</a:t>
-            </a:r>
-            <a:r>
-              <a:rPr lang="en-US" sz="1200" b="1" dirty="0">
-                <a:latin typeface="Consolas" panose="020B0609020204030204" pitchFamily="49" charset="0"/>
-              </a:rPr>
-              <a:t> = </a:t>
-            </a:r>
-            <a:r>
-              <a:rPr lang="en-US" sz="1200" b="1" dirty="0" err="1">
-                <a:latin typeface="Consolas" panose="020B0609020204030204" pitchFamily="49" charset="0"/>
+                <a:hlinkClick r:id="rId13"/>
               </a:rPr>
               <a:t>pd.DataFrame</a:t>
             </a:r>
@@ -9809,6 +9966,7 @@
             <a:r>
               <a:rPr lang="en-US" sz="1200" b="1" dirty="0" err="1">
                 <a:latin typeface="Consolas" panose="020B0609020204030204" pitchFamily="49" charset="0"/>
+                <a:hlinkClick r:id="rId13"/>
               </a:rPr>
               <a:t>pd.DataFrame</a:t>
             </a:r>
@@ -11432,22 +11590,60 @@
           <a:lstStyle/>
           <a:p>
             <a:r>
+              <a:rPr lang="en-US" sz="1200" b="1" dirty="0">
+                <a:latin typeface="Consolas" panose="020B0609020204030204" pitchFamily="49" charset="0"/>
+              </a:rPr>
+              <a:t>df = </a:t>
+            </a:r>
+            <a:r>
               <a:rPr lang="en-US" sz="1200" b="1" dirty="0" err="1">
                 <a:latin typeface="Consolas" panose="020B0609020204030204" pitchFamily="49" charset="0"/>
-              </a:rPr>
-              <a:t>df</a:t>
+                <a:hlinkClick r:id="rId13"/>
+              </a:rPr>
+              <a:t>pd.DataFrame</a:t>
             </a:r>
             <a:r>
               <a:rPr lang="en-US" sz="1200" b="1" dirty="0">
                 <a:latin typeface="Consolas" panose="020B0609020204030204" pitchFamily="49" charset="0"/>
               </a:rPr>
-              <a:t> = </a:t>
+              <a:t>(</a:t>
+            </a:r>
+          </a:p>
+          <a:p>
+            <a:r>
+              <a:rPr lang="en-US" sz="1200" b="1" dirty="0">
+                <a:latin typeface="Consolas" panose="020B0609020204030204" pitchFamily="49" charset="0"/>
+              </a:rPr>
+              <a:t>          {"a" : [4 ,5, 6], </a:t>
+            </a:r>
+          </a:p>
+          <a:p>
+            <a:r>
+              <a:rPr lang="en-US" sz="1200" b="1" dirty="0">
+                <a:latin typeface="Consolas" panose="020B0609020204030204" pitchFamily="49" charset="0"/>
+              </a:rPr>
+              <a:t>           "b" : [7, 8, 9], </a:t>
+            </a:r>
+          </a:p>
+          <a:p>
+            <a:r>
+              <a:rPr lang="en-US" sz="1200" b="1" dirty="0">
+                <a:latin typeface="Consolas" panose="020B0609020204030204" pitchFamily="49" charset="0"/>
+              </a:rPr>
+              <a:t>           "c" : [10, 11, 12]},    index = </a:t>
             </a:r>
             <a:r>
               <a:rPr lang="en-US" sz="1200" b="1" dirty="0" err="1">
                 <a:latin typeface="Consolas" panose="020B0609020204030204" pitchFamily="49" charset="0"/>
               </a:rPr>
-              <a:t>pd.DataFrame</a:t>
+              <a:t>pd.</a:t>
+            </a:r>
+            <a:r>
+              <a:rPr lang="en-US" sz="1200" b="1" dirty="0" err="1">
+                <a:latin typeface="Consolas" panose="020B0609020204030204" pitchFamily="49" charset="0"/>
+                <a:hlinkClick r:id="rId14"/>
+              </a:rPr>
+              <a:t>MultiIndex.from_tuples</a:t>
             </a:r>
             <a:r>
               <a:rPr lang="en-US" sz="1200" b="1" dirty="0">
@@ -11461,7 +11657,7 @@
               <a:rPr lang="en-US" sz="1200" b="1" dirty="0">
                 <a:latin typeface="Consolas" panose="020B0609020204030204" pitchFamily="49" charset="0"/>
               </a:rPr>
-              <a:t>          {"a" : [4 ,5, 6], </a:t>
+              <a:t>          [('d',1),('d',2),('e',2)],</a:t>
             </a:r>
           </a:p>
           <a:p>
@@ -11469,59 +11665,20 @@
               <a:rPr lang="en-US" sz="1200" b="1" dirty="0">
                 <a:latin typeface="Consolas" panose="020B0609020204030204" pitchFamily="49" charset="0"/>
               </a:rPr>
-              <a:t>           "b" : [7, 8, 9], </a:t>
-            </a:r>
-          </a:p>
-          <a:p>
+              <a:t>             names=['</a:t>
+            </a:r>
+            <a:r>
+              <a:rPr lang="en-US" sz="1200" b="1" dirty="0" err="1">
+                <a:latin typeface="Consolas" panose="020B0609020204030204" pitchFamily="49" charset="0"/>
+              </a:rPr>
+              <a:t>n','v</a:t>
+            </a:r>
             <a:r>
               <a:rPr lang="en-US" sz="1200" b="1" dirty="0">
                 <a:latin typeface="Consolas" panose="020B0609020204030204" pitchFamily="49" charset="0"/>
               </a:rPr>
-              <a:t>           "c" : [10, 11, 12]},    index = </a:t>
-            </a:r>
-            <a:r>
-              <a:rPr lang="en-US" sz="1200" b="1" dirty="0" err="1">
-                <a:latin typeface="Consolas" panose="020B0609020204030204" pitchFamily="49" charset="0"/>
-              </a:rPr>
-              <a:t>pd.MultiIndex.from_tuples</a:t>
-            </a:r>
-            <a:r>
-              <a:rPr lang="en-US" sz="1200" b="1" dirty="0">
-                <a:latin typeface="Consolas" panose="020B0609020204030204" pitchFamily="49" charset="0"/>
-              </a:rPr>
-              <a:t>(</a:t>
-            </a:r>
-          </a:p>
-          <a:p>
-            <a:r>
-              <a:rPr lang="en-US" sz="1200" b="1" dirty="0">
-                <a:latin typeface="Consolas" panose="020B0609020204030204" pitchFamily="49" charset="0"/>
-              </a:rPr>
-              <a:t>          [('d',1),('d',2),('e',2)],</a:t>
-            </a:r>
-          </a:p>
-          <a:p>
-            <a:r>
-              <a:rPr lang="en-US" sz="1200" b="1" dirty="0">
-                <a:latin typeface="Consolas" panose="020B0609020204030204" pitchFamily="49" charset="0"/>
-              </a:rPr>
-              <a:t>             names=['</a:t>
-            </a:r>
-            <a:r>
-              <a:rPr lang="en-US" sz="1200" b="1" dirty="0" err="1">
-                <a:latin typeface="Consolas" panose="020B0609020204030204" pitchFamily="49" charset="0"/>
-              </a:rPr>
-              <a:t>n','v</a:t>
-            </a:r>
-            <a:r>
-              <a:rPr lang="en-US" sz="1200" b="1">
-                <a:latin typeface="Consolas" panose="020B0609020204030204" pitchFamily="49" charset="0"/>
-              </a:rPr>
               <a:t>']))</a:t>
             </a:r>
-            <a:endParaRPr lang="en-US" sz="1200" b="1" dirty="0">
-              <a:latin typeface="Consolas" panose="020B0609020204030204" pitchFamily="49" charset="0"/>
-            </a:endParaRPr>
           </a:p>
           <a:p>
             <a:r>
@@ -11691,7 +11848,14 @@
               <a:rPr lang="en-US" sz="1200" b="1" dirty="0" err="1">
                 <a:latin typeface="Consolas" panose="020B0609020204030204" pitchFamily="49" charset="0"/>
               </a:rPr>
-              <a:t>pd.melt</a:t>
+              <a:t>pd.</a:t>
+            </a:r>
+            <a:r>
+              <a:rPr lang="en-US" sz="1200" b="1" dirty="0" err="1">
+                <a:latin typeface="Consolas" panose="020B0609020204030204" pitchFamily="49" charset="0"/>
+                <a:hlinkClick r:id="rId4"/>
+              </a:rPr>
+              <a:t>melt</a:t>
             </a:r>
             <a:r>
               <a:rPr lang="en-US" sz="1200" b="1" dirty="0">
@@ -11717,13 +11881,26 @@
               <a:rPr lang="en-US" sz="1200" b="1" dirty="0">
                 <a:latin typeface="Consolas" panose="020B0609020204030204" pitchFamily="49" charset="0"/>
               </a:rPr>
-              <a:t>        .rename(columns={</a:t>
-            </a:r>
-          </a:p>
-          <a:p>
+              <a:t>        .</a:t>
+            </a:r>
             <a:r>
               <a:rPr lang="en-US" sz="1200" b="1" dirty="0">
                 <a:latin typeface="Consolas" panose="020B0609020204030204" pitchFamily="49" charset="0"/>
+                <a:hlinkClick r:id="rId8"/>
+              </a:rPr>
+              <a:t>rename</a:t>
+            </a:r>
+            <a:r>
+              <a:rPr lang="en-US" sz="1200" b="1" dirty="0">
+                <a:latin typeface="Consolas" panose="020B0609020204030204" pitchFamily="49" charset="0"/>
+              </a:rPr>
+              <a:t>(columns={</a:t>
+            </a:r>
+          </a:p>
+          <a:p>
+            <a:r>
+              <a:rPr lang="en-US" sz="1200" b="1" dirty="0">
+                <a:latin typeface="Consolas" panose="020B0609020204030204" pitchFamily="49" charset="0"/>
               </a:rPr>
               <a:t>                'variable' : '</a:t>
             </a:r>
@@ -11765,7 +11942,20 @@
               <a:rPr lang="en-US" sz="1200" b="1" dirty="0">
                 <a:latin typeface="Consolas" panose="020B0609020204030204" pitchFamily="49" charset="0"/>
               </a:rPr>
-              <a:t>        .query('</a:t>
+              <a:t>        .</a:t>
+            </a:r>
+            <a:r>
+              <a:rPr lang="en-US" sz="1200" b="1" dirty="0">
+                <a:latin typeface="Consolas" panose="020B0609020204030204" pitchFamily="49" charset="0"/>
+                <a:hlinkClick r:id="rId15"/>
+              </a:rPr>
+              <a:t>query</a:t>
+            </a:r>
+            <a:r>
+              <a:rPr lang="en-US" sz="1200" b="1" dirty="0">
+                <a:latin typeface="Consolas" panose="020B0609020204030204" pitchFamily="49" charset="0"/>
+              </a:rPr>
+              <a:t>('</a:t>
             </a:r>
             <a:r>
               <a:rPr lang="en-US" sz="1200" b="1" dirty="0" err="1">
@@ -12711,7 +12901,14 @@
               <a:rPr lang="en-US" sz="1200" b="1" dirty="0" err="1">
                 <a:latin typeface="Consolas" panose="020B0609020204030204" pitchFamily="49" charset="0"/>
               </a:rPr>
-              <a:t>df.drop_duplicates</a:t>
+              <a:t>df.</a:t>
+            </a:r>
+            <a:r>
+              <a:rPr lang="en-US" sz="1200" b="1" dirty="0" err="1">
+                <a:latin typeface="Consolas" panose="020B0609020204030204" pitchFamily="49" charset="0"/>
+                <a:hlinkClick r:id="rId16"/>
+              </a:rPr>
+              <a:t>drop_duplicates</a:t>
             </a:r>
             <a:r>
               <a:rPr lang="en-US" sz="1200" b="1" dirty="0">
@@ -12732,7 +12929,14 @@
               <a:rPr lang="en-US" sz="1200" b="1" dirty="0" err="1">
                 <a:latin typeface="Consolas" panose="020B0609020204030204" pitchFamily="49" charset="0"/>
               </a:rPr>
-              <a:t>df.head</a:t>
+              <a:t>df.</a:t>
+            </a:r>
+            <a:r>
+              <a:rPr lang="en-US" sz="1200" b="1" dirty="0" err="1">
+                <a:latin typeface="Consolas" panose="020B0609020204030204" pitchFamily="49" charset="0"/>
+                <a:hlinkClick r:id="rId17"/>
+              </a:rPr>
+              <a:t>head</a:t>
             </a:r>
             <a:r>
               <a:rPr lang="en-US" sz="1200" b="1" dirty="0">
@@ -12753,7 +12957,14 @@
               <a:rPr lang="en-US" sz="1200" b="1" dirty="0" err="1">
                 <a:latin typeface="Consolas" panose="020B0609020204030204" pitchFamily="49" charset="0"/>
               </a:rPr>
-              <a:t>df.tail</a:t>
+              <a:t>df.</a:t>
+            </a:r>
+            <a:r>
+              <a:rPr lang="en-US" sz="1200" b="1" dirty="0" err="1">
+                <a:latin typeface="Consolas" panose="020B0609020204030204" pitchFamily="49" charset="0"/>
+                <a:hlinkClick r:id="rId18"/>
+              </a:rPr>
+              <a:t>tail</a:t>
             </a:r>
             <a:r>
               <a:rPr lang="en-US" sz="1200" b="1" dirty="0">
@@ -14320,7 +14531,7 @@
           <a:p>
             <a:r>
               <a:rPr lang="en-US" sz="800" dirty="0">
-                <a:hlinkClick r:id="rId2"/>
+                <a:hlinkClick r:id="rId19"/>
               </a:rPr>
               <a:t>http://pandas.pydata.org/</a:t>
             </a:r>
@@ -14346,7 +14557,7 @@
             </a:r>
             <a:r>
               <a:rPr lang="en-US" sz="800" dirty="0">
-                <a:hlinkClick r:id="rId3"/>
+                <a:hlinkClick r:id="rId20"/>
               </a:rPr>
               <a:t>https://www.rstudio.com/wp-content/uploads/2015/02/data-wrangling-cheatsheet.pdf</a:t>
             </a:r>
@@ -14356,7 +14567,7 @@
             </a:r>
             <a:r>
               <a:rPr lang="en-US" sz="800" dirty="0">
-                <a:hlinkClick r:id="rId4"/>
+                <a:hlinkClick r:id="rId21"/>
               </a:rPr>
               <a:t>Princeton Consultants</a:t>
             </a:r>
@@ -15513,7 +15724,14 @@
               <a:rPr lang="en-US" sz="1200" b="1" dirty="0" err="1">
                 <a:latin typeface="Consolas" panose="020B0609020204030204" pitchFamily="49" charset="0"/>
               </a:rPr>
-              <a:t>df.filter</a:t>
+              <a:t>df.</a:t>
+            </a:r>
+            <a:r>
+              <a:rPr lang="en-US" sz="1200" b="1" dirty="0" err="1">
+                <a:latin typeface="Consolas" panose="020B0609020204030204" pitchFamily="49" charset="0"/>
+                <a:hlinkClick r:id="rId22"/>
+              </a:rPr>
+              <a:t>filter</a:t>
             </a:r>
             <a:r>
               <a:rPr lang="en-US" sz="1200" b="1" dirty="0">
@@ -15579,7 +15797,14 @@
               <a:rPr lang="en-US" sz="1200" b="1" dirty="0" err="1">
                 <a:latin typeface="Consolas" panose="020B0609020204030204" pitchFamily="49" charset="0"/>
               </a:rPr>
-              <a:t>df.loc</a:t>
+              <a:t>df.</a:t>
+            </a:r>
+            <a:r>
+              <a:rPr lang="en-US" sz="1200" b="1" dirty="0" err="1">
+                <a:latin typeface="Consolas" panose="020B0609020204030204" pitchFamily="49" charset="0"/>
+                <a:hlinkClick r:id="rId23"/>
+              </a:rPr>
+              <a:t>loc</a:t>
             </a:r>
             <a:r>
               <a:rPr lang="en-US" sz="1200" b="1" dirty="0">
@@ -15599,7 +15824,14 @@
               <a:rPr lang="en-US" sz="1200" b="1" dirty="0" err="1">
                 <a:latin typeface="Consolas" panose="020B0609020204030204" pitchFamily="49" charset="0"/>
               </a:rPr>
-              <a:t>df.iloc</a:t>
+              <a:t>df.</a:t>
+            </a:r>
+            <a:r>
+              <a:rPr lang="en-US" sz="1200" b="1" dirty="0" err="1">
+                <a:latin typeface="Consolas" panose="020B0609020204030204" pitchFamily="49" charset="0"/>
+                <a:hlinkClick r:id="rId24"/>
+              </a:rPr>
+              <a:t>iloc</a:t>
             </a:r>
             <a:r>
               <a:rPr lang="en-US" sz="1200" b="1" dirty="0">
@@ -15619,7 +15851,14 @@
               <a:rPr lang="en-US" sz="1200" b="1" dirty="0" err="1">
                 <a:latin typeface="Consolas" panose="020B0609020204030204" pitchFamily="49" charset="0"/>
               </a:rPr>
-              <a:t>df.loc</a:t>
+              <a:t>df.</a:t>
+            </a:r>
+            <a:r>
+              <a:rPr lang="en-US" sz="1200" b="1" dirty="0" err="1">
+                <a:latin typeface="Consolas" panose="020B0609020204030204" pitchFamily="49" charset="0"/>
+                <a:hlinkClick r:id="rId23"/>
+              </a:rPr>
+              <a:t>loc</a:t>
             </a:r>
             <a:r>
               <a:rPr lang="en-US" sz="1200" b="1" dirty="0">
@@ -16452,7 +16691,14 @@
               <a:rPr lang="en-US" sz="1200" b="1" dirty="0" err="1">
                 <a:latin typeface="Consolas" panose="020B0609020204030204" pitchFamily="49" charset="0"/>
               </a:rPr>
-              <a:t>df.sample</a:t>
+              <a:t>df.</a:t>
+            </a:r>
+            <a:r>
+              <a:rPr lang="en-US" sz="1200" b="1" dirty="0" err="1">
+                <a:latin typeface="Consolas" panose="020B0609020204030204" pitchFamily="49" charset="0"/>
+                <a:hlinkClick r:id="rId25"/>
+              </a:rPr>
+              <a:t>sample</a:t>
             </a:r>
             <a:r>
               <a:rPr lang="en-US" sz="1200" b="1" dirty="0">
@@ -16485,7 +16731,14 @@
               <a:rPr lang="en-US" sz="1200" b="1" dirty="0" err="1">
                 <a:latin typeface="Consolas" panose="020B0609020204030204" pitchFamily="49" charset="0"/>
               </a:rPr>
-              <a:t>df.sample</a:t>
+              <a:t>df.</a:t>
+            </a:r>
+            <a:r>
+              <a:rPr lang="en-US" sz="1200" b="1" dirty="0" err="1">
+                <a:latin typeface="Consolas" panose="020B0609020204030204" pitchFamily="49" charset="0"/>
+                <a:hlinkClick r:id="rId25"/>
+              </a:rPr>
+              <a:t>sample</a:t>
             </a:r>
             <a:r>
               <a:rPr lang="en-US" sz="1200" b="1" dirty="0">
@@ -16505,7 +16758,14 @@
               <a:rPr lang="en-US" sz="1200" b="1" dirty="0" err="1">
                 <a:latin typeface="Consolas" panose="020B0609020204030204" pitchFamily="49" charset="0"/>
               </a:rPr>
-              <a:t>df.iloc</a:t>
+              <a:t>df.</a:t>
+            </a:r>
+            <a:r>
+              <a:rPr lang="en-US" sz="1200" b="1" dirty="0" err="1">
+                <a:latin typeface="Consolas" panose="020B0609020204030204" pitchFamily="49" charset="0"/>
+                <a:hlinkClick r:id="rId26"/>
+              </a:rPr>
+              <a:t>iloc</a:t>
             </a:r>
             <a:r>
               <a:rPr lang="en-US" sz="1200" b="1" dirty="0">
@@ -16525,7 +16785,14 @@
               <a:rPr lang="en-US" sz="1200" b="1" dirty="0" err="1">
                 <a:latin typeface="Consolas" panose="020B0609020204030204" pitchFamily="49" charset="0"/>
               </a:rPr>
-              <a:t>df.nlargest</a:t>
+              <a:t>df.</a:t>
+            </a:r>
+            <a:r>
+              <a:rPr lang="en-US" sz="1200" b="1" dirty="0" err="1">
+                <a:latin typeface="Consolas" panose="020B0609020204030204" pitchFamily="49" charset="0"/>
+                <a:hlinkClick r:id="rId27"/>
+              </a:rPr>
+              <a:t>nlargest</a:t>
             </a:r>
             <a:r>
               <a:rPr lang="en-US" sz="1200" b="1" dirty="0">
@@ -16545,7 +16812,14 @@
               <a:rPr lang="en-US" sz="1200" b="1" dirty="0" err="1">
                 <a:latin typeface="Consolas" panose="020B0609020204030204" pitchFamily="49" charset="0"/>
               </a:rPr>
-              <a:t>df.nsmallest</a:t>
+              <a:t>df.</a:t>
+            </a:r>
+            <a:r>
+              <a:rPr lang="en-US" sz="1200" b="1" dirty="0" err="1">
+                <a:latin typeface="Consolas" panose="020B0609020204030204" pitchFamily="49" charset="0"/>
+                <a:hlinkClick r:id="rId28"/>
+              </a:rPr>
+              <a:t>nsmallest</a:t>
             </a:r>
             <a:r>
               <a:rPr lang="en-US" sz="1200" b="1" dirty="0">
@@ -16733,10 +17007,25 @@
           <a:p>
             <a:pPr algn="ctr"/>
             <a:r>
-              <a:rPr lang="en-US" sz="2800" b="1" dirty="0"/>
+              <a:rPr lang="en-US" sz="2800" b="1" dirty="0">
+                <a:solidFill>
+                  <a:schemeClr val="bg1"/>
+                </a:solidFill>
+                <a:hlinkClick r:id="rId2">
+                  <a:extLst>
+                    <a:ext uri="{A12FA001-AC4F-418D-AE19-62706E023703}">
+                      <ahyp:hlinkClr xmlns:ahyp="http://schemas.microsoft.com/office/drawing/2018/hyperlinkcolor" val="tx"/>
+                    </a:ext>
+                  </a:extLst>
+                </a:hlinkClick>
+              </a:rPr>
               <a:t>Summarize Data</a:t>
             </a:r>
-            <a:endParaRPr lang="en-US" sz="2683" dirty="0"/>
+            <a:endParaRPr lang="en-US" sz="2683" dirty="0">
+              <a:solidFill>
+                <a:schemeClr val="bg1"/>
+              </a:solidFill>
+            </a:endParaRPr>
           </a:p>
         </p:txBody>
       </p:sp>
@@ -16821,10 +17110,25 @@
           <a:p>
             <a:pPr algn="ctr"/>
             <a:r>
-              <a:rPr lang="en-US" sz="2800" b="1" dirty="0"/>
+              <a:rPr lang="en-US" sz="2800" b="1" dirty="0">
+                <a:solidFill>
+                  <a:schemeClr val="bg1"/>
+                </a:solidFill>
+                <a:hlinkClick r:id="rId3">
+                  <a:extLst>
+                    <a:ext uri="{A12FA001-AC4F-418D-AE19-62706E023703}">
+                      <ahyp:hlinkClr xmlns:ahyp="http://schemas.microsoft.com/office/drawing/2018/hyperlinkcolor" val="tx"/>
+                    </a:ext>
+                  </a:extLst>
+                </a:hlinkClick>
+              </a:rPr>
               <a:t>Combine Data Sets</a:t>
             </a:r>
-            <a:endParaRPr lang="en-US" sz="2683" dirty="0"/>
+            <a:endParaRPr lang="en-US" sz="2683" dirty="0">
+              <a:solidFill>
+                <a:schemeClr val="bg1"/>
+              </a:solidFill>
+            </a:endParaRPr>
           </a:p>
         </p:txBody>
       </p:sp>
@@ -16865,6 +17169,7 @@
             <a:r>
               <a:rPr lang="en-US" sz="1200" b="1" dirty="0" err="1">
                 <a:latin typeface="Consolas" panose="020B0609020204030204" pitchFamily="49" charset="0"/>
+                <a:hlinkClick r:id="rId4"/>
               </a:rPr>
               <a:t>value_counts</a:t>
             </a:r>
@@ -16938,6 +17243,7 @@
             <a:r>
               <a:rPr lang="en-US" sz="1200" b="1" dirty="0" err="1">
                 <a:latin typeface="Consolas" panose="020B0609020204030204" pitchFamily="49" charset="0"/>
+                <a:hlinkClick r:id="rId5"/>
               </a:rPr>
               <a:t>nunique</a:t>
             </a:r>
@@ -16960,7 +17266,14 @@
               <a:rPr lang="en-US" sz="1200" b="1" dirty="0" err="1">
                 <a:latin typeface="Consolas" panose="020B0609020204030204" pitchFamily="49" charset="0"/>
               </a:rPr>
-              <a:t>df.describe</a:t>
+              <a:t>df.</a:t>
+            </a:r>
+            <a:r>
+              <a:rPr lang="en-US" sz="1200" b="1" dirty="0" err="1">
+                <a:latin typeface="Consolas" panose="020B0609020204030204" pitchFamily="49" charset="0"/>
+                <a:hlinkClick r:id="rId6"/>
+              </a:rPr>
+              <a:t>describe</a:t>
             </a:r>
             <a:r>
               <a:rPr lang="en-US" sz="1200" b="1" dirty="0">
@@ -17642,8 +17955,15 @@
             <a:r>
               <a:rPr lang="en-US" sz="1200" b="1" dirty="0">
                 <a:latin typeface="Consolas" panose="020B0609020204030204" pitchFamily="49" charset="0"/>
-              </a:rPr>
-              <a:t>sum()</a:t>
+                <a:hlinkClick r:id="rId7"/>
+              </a:rPr>
+              <a:t>sum</a:t>
+            </a:r>
+            <a:r>
+              <a:rPr lang="en-US" sz="1200" b="1" dirty="0">
+                <a:latin typeface="Consolas" panose="020B0609020204030204" pitchFamily="49" charset="0"/>
+              </a:rPr>
+              <a:t>()</a:t>
             </a:r>
           </a:p>
           <a:p>
@@ -17657,8 +17977,15 @@
             <a:r>
               <a:rPr lang="en-US" sz="1200" b="1" dirty="0">
                 <a:latin typeface="Consolas" panose="020B0609020204030204" pitchFamily="49" charset="0"/>
-              </a:rPr>
-              <a:t>count()</a:t>
+                <a:hlinkClick r:id="rId8"/>
+              </a:rPr>
+              <a:t>count</a:t>
+            </a:r>
+            <a:r>
+              <a:rPr lang="en-US" sz="1200" b="1" dirty="0">
+                <a:latin typeface="Consolas" panose="020B0609020204030204" pitchFamily="49" charset="0"/>
+              </a:rPr>
+              <a:t>()</a:t>
             </a:r>
           </a:p>
           <a:p>
@@ -17672,8 +17999,15 @@
             <a:r>
               <a:rPr lang="en-US" sz="1200" b="1" dirty="0">
                 <a:latin typeface="Consolas" panose="020B0609020204030204" pitchFamily="49" charset="0"/>
-              </a:rPr>
-              <a:t>median()</a:t>
+                <a:hlinkClick r:id="rId9"/>
+              </a:rPr>
+              <a:t>median</a:t>
+            </a:r>
+            <a:r>
+              <a:rPr lang="en-US" sz="1200" b="1" dirty="0">
+                <a:latin typeface="Consolas" panose="020B0609020204030204" pitchFamily="49" charset="0"/>
+              </a:rPr>
+              <a:t>()</a:t>
             </a:r>
           </a:p>
           <a:p>
@@ -17687,8 +18021,15 @@
             <a:r>
               <a:rPr lang="en-US" sz="1200" b="1" dirty="0">
                 <a:latin typeface="Consolas" panose="020B0609020204030204" pitchFamily="49" charset="0"/>
-              </a:rPr>
-              <a:t>quantile([0.25,0.75])</a:t>
+                <a:hlinkClick r:id="rId10"/>
+              </a:rPr>
+              <a:t>quantile</a:t>
+            </a:r>
+            <a:r>
+              <a:rPr lang="en-US" sz="1200" b="1" dirty="0">
+                <a:latin typeface="Consolas" panose="020B0609020204030204" pitchFamily="49" charset="0"/>
+              </a:rPr>
+              <a:t>([0.25,0.75])</a:t>
             </a:r>
           </a:p>
           <a:p>
@@ -17702,8 +18043,15 @@
             <a:r>
               <a:rPr lang="en-US" sz="1200" b="1" dirty="0">
                 <a:latin typeface="Consolas" panose="020B0609020204030204" pitchFamily="49" charset="0"/>
-              </a:rPr>
-              <a:t>apply(</a:t>
+                <a:hlinkClick r:id="rId11"/>
+              </a:rPr>
+              <a:t>apply</a:t>
+            </a:r>
+            <a:r>
+              <a:rPr lang="en-US" sz="1200" b="1" dirty="0">
+                <a:latin typeface="Consolas" panose="020B0609020204030204" pitchFamily="49" charset="0"/>
+              </a:rPr>
+              <a:t>(</a:t>
             </a:r>
             <a:r>
               <a:rPr lang="en-US" sz="1200" b="1" i="1" dirty="0">
@@ -17752,8 +18100,15 @@
             <a:r>
               <a:rPr lang="en-US" sz="1200" b="1" dirty="0">
                 <a:latin typeface="Consolas" panose="020B0609020204030204" pitchFamily="49" charset="0"/>
-              </a:rPr>
-              <a:t>min()</a:t>
+                <a:hlinkClick r:id="rId12"/>
+              </a:rPr>
+              <a:t>min</a:t>
+            </a:r>
+            <a:r>
+              <a:rPr lang="en-US" sz="1200" b="1" dirty="0">
+                <a:latin typeface="Consolas" panose="020B0609020204030204" pitchFamily="49" charset="0"/>
+              </a:rPr>
+              <a:t>()</a:t>
             </a:r>
           </a:p>
           <a:p>
@@ -17767,8 +18122,15 @@
             <a:r>
               <a:rPr lang="en-US" sz="1200" b="1" dirty="0">
                 <a:latin typeface="Consolas" panose="020B0609020204030204" pitchFamily="49" charset="0"/>
-              </a:rPr>
-              <a:t>max()</a:t>
+                <a:hlinkClick r:id="rId13"/>
+              </a:rPr>
+              <a:t>max</a:t>
+            </a:r>
+            <a:r>
+              <a:rPr lang="en-US" sz="1200" b="1" dirty="0">
+                <a:latin typeface="Consolas" panose="020B0609020204030204" pitchFamily="49" charset="0"/>
+              </a:rPr>
+              <a:t>()</a:t>
             </a:r>
           </a:p>
           <a:p>
@@ -17782,8 +18144,15 @@
             <a:r>
               <a:rPr lang="en-US" sz="1200" b="1" dirty="0">
                 <a:latin typeface="Consolas" panose="020B0609020204030204" pitchFamily="49" charset="0"/>
-              </a:rPr>
-              <a:t>mean()</a:t>
+                <a:hlinkClick r:id="rId14"/>
+              </a:rPr>
+              <a:t>mean</a:t>
+            </a:r>
+            <a:r>
+              <a:rPr lang="en-US" sz="1200" b="1" dirty="0">
+                <a:latin typeface="Consolas" panose="020B0609020204030204" pitchFamily="49" charset="0"/>
+              </a:rPr>
+              <a:t>()</a:t>
             </a:r>
           </a:p>
           <a:p>
@@ -17797,6 +18166,7 @@
             <a:r>
               <a:rPr lang="en-US" sz="1200" b="1" dirty="0" err="1">
                 <a:latin typeface="Consolas" panose="020B0609020204030204" pitchFamily="49" charset="0"/>
+                <a:hlinkClick r:id="rId15"/>
               </a:rPr>
               <a:t>var</a:t>
             </a:r>
@@ -17818,6 +18188,7 @@
             <a:r>
               <a:rPr lang="en-US" sz="1200" b="1" dirty="0" err="1">
                 <a:latin typeface="Consolas" panose="020B0609020204030204" pitchFamily="49" charset="0"/>
+                <a:hlinkClick r:id="rId16"/>
               </a:rPr>
               <a:t>std</a:t>
             </a:r>
@@ -18822,7 +19193,14 @@
               <a:rPr lang="en-US" sz="1200" b="1" dirty="0" err="1">
                 <a:latin typeface="Consolas" panose="020B0609020204030204" pitchFamily="49" charset="0"/>
               </a:rPr>
-              <a:t>df.assign</a:t>
+              <a:t>df.</a:t>
+            </a:r>
+            <a:r>
+              <a:rPr lang="en-US" sz="1200" b="1" dirty="0" err="1">
+                <a:latin typeface="Consolas" panose="020B0609020204030204" pitchFamily="49" charset="0"/>
+                <a:hlinkClick r:id="rId17"/>
+              </a:rPr>
+              <a:t>assign</a:t>
             </a:r>
             <a:r>
               <a:rPr lang="en-US" sz="1200" b="1" dirty="0">
@@ -18934,7 +19312,14 @@
               <a:rPr lang="en-US" sz="1200" b="1" dirty="0" err="1">
                 <a:latin typeface="Consolas" panose="020B0609020204030204" pitchFamily="49" charset="0"/>
               </a:rPr>
-              <a:t>pd.qcut</a:t>
+              <a:t>pd.</a:t>
+            </a:r>
+            <a:r>
+              <a:rPr lang="en-US" sz="1200" b="1" dirty="0" err="1">
+                <a:latin typeface="Consolas" panose="020B0609020204030204" pitchFamily="49" charset="0"/>
+                <a:hlinkClick r:id="rId18"/>
+              </a:rPr>
+              <a:t>qcut</a:t>
             </a:r>
             <a:r>
               <a:rPr lang="en-US" sz="1200" b="1" dirty="0">
@@ -20292,8 +20677,15 @@
             <a:r>
               <a:rPr lang="en-US" sz="1200" b="1" dirty="0">
                 <a:latin typeface="Consolas" panose="020B0609020204030204" pitchFamily="49" charset="0"/>
-              </a:rPr>
-              <a:t>shift(1)</a:t>
+                <a:hlinkClick r:id="rId19"/>
+              </a:rPr>
+              <a:t>shift</a:t>
+            </a:r>
+            <a:r>
+              <a:rPr lang="en-US" sz="1200" b="1" dirty="0">
+                <a:latin typeface="Consolas" panose="020B0609020204030204" pitchFamily="49" charset="0"/>
+              </a:rPr>
+              <a:t>(1)</a:t>
             </a:r>
           </a:p>
           <a:p>
@@ -20307,8 +20699,15 @@
             <a:r>
               <a:rPr lang="en-US" sz="1200" b="1" dirty="0">
                 <a:latin typeface="Consolas" panose="020B0609020204030204" pitchFamily="49" charset="0"/>
-              </a:rPr>
-              <a:t>rank(method='dense')</a:t>
+                <a:hlinkClick r:id="rId20"/>
+              </a:rPr>
+              <a:t>rank</a:t>
+            </a:r>
+            <a:r>
+              <a:rPr lang="en-US" sz="1200" b="1" dirty="0">
+                <a:latin typeface="Consolas" panose="020B0609020204030204" pitchFamily="49" charset="0"/>
+              </a:rPr>
+              <a:t>(method='dense')</a:t>
             </a:r>
           </a:p>
           <a:p>
@@ -20322,8 +20721,15 @@
             <a:r>
               <a:rPr lang="en-US" sz="1200" b="1" dirty="0">
                 <a:latin typeface="Consolas" panose="020B0609020204030204" pitchFamily="49" charset="0"/>
-              </a:rPr>
-              <a:t>rank(method='min')</a:t>
+                <a:hlinkClick r:id="rId20"/>
+              </a:rPr>
+              <a:t>rank</a:t>
+            </a:r>
+            <a:r>
+              <a:rPr lang="en-US" sz="1200" b="1" dirty="0">
+                <a:latin typeface="Consolas" panose="020B0609020204030204" pitchFamily="49" charset="0"/>
+              </a:rPr>
+              <a:t>(method='min')</a:t>
             </a:r>
           </a:p>
           <a:p>
@@ -20337,8 +20743,15 @@
             <a:r>
               <a:rPr lang="en-US" sz="1200" b="1" dirty="0">
                 <a:latin typeface="Consolas" panose="020B0609020204030204" pitchFamily="49" charset="0"/>
-              </a:rPr>
-              <a:t>rank(</a:t>
+                <a:hlinkClick r:id="rId20"/>
+              </a:rPr>
+              <a:t>rank</a:t>
+            </a:r>
+            <a:r>
+              <a:rPr lang="en-US" sz="1200" b="1" dirty="0">
+                <a:latin typeface="Consolas" panose="020B0609020204030204" pitchFamily="49" charset="0"/>
+              </a:rPr>
+              <a:t>(</a:t>
             </a:r>
             <a:r>
               <a:rPr lang="en-US" sz="1200" b="1" dirty="0" err="1">
@@ -20364,8 +20777,15 @@
             <a:r>
               <a:rPr lang="en-US" sz="1200" b="1" dirty="0">
                 <a:latin typeface="Consolas" panose="020B0609020204030204" pitchFamily="49" charset="0"/>
-              </a:rPr>
-              <a:t>rank(method='first')</a:t>
+                <a:hlinkClick r:id="rId20"/>
+              </a:rPr>
+              <a:t>rank</a:t>
+            </a:r>
+            <a:r>
+              <a:rPr lang="en-US" sz="1200" b="1" dirty="0">
+                <a:latin typeface="Consolas" panose="020B0609020204030204" pitchFamily="49" charset="0"/>
+              </a:rPr>
+              <a:t>(method='first')</a:t>
             </a:r>
           </a:p>
           <a:p>
@@ -20402,8 +20822,15 @@
             <a:r>
               <a:rPr lang="en-US" sz="1200" b="1" dirty="0">
                 <a:latin typeface="Consolas" panose="020B0609020204030204" pitchFamily="49" charset="0"/>
-              </a:rPr>
-              <a:t>shift(-1)</a:t>
+                <a:hlinkClick r:id="rId19"/>
+              </a:rPr>
+              <a:t>shift</a:t>
+            </a:r>
+            <a:r>
+              <a:rPr lang="en-US" sz="1200" b="1" dirty="0">
+                <a:latin typeface="Consolas" panose="020B0609020204030204" pitchFamily="49" charset="0"/>
+              </a:rPr>
+              <a:t>(-1)</a:t>
             </a:r>
           </a:p>
           <a:p>
@@ -20420,6 +20847,7 @@
             <a:r>
               <a:rPr lang="en-US" sz="1200" b="1" dirty="0" err="1">
                 <a:latin typeface="Consolas" panose="020B0609020204030204" pitchFamily="49" charset="0"/>
+                <a:hlinkClick r:id="rId21"/>
               </a:rPr>
               <a:t>cumsum</a:t>
             </a:r>
@@ -20441,6 +20869,7 @@
             <a:r>
               <a:rPr lang="en-US" sz="1200" b="1" dirty="0" err="1">
                 <a:latin typeface="Consolas" panose="020B0609020204030204" pitchFamily="49" charset="0"/>
+                <a:hlinkClick r:id="rId22"/>
               </a:rPr>
               <a:t>cummax</a:t>
             </a:r>
@@ -20462,6 +20891,7 @@
             <a:r>
               <a:rPr lang="en-US" sz="1200" b="1" dirty="0" err="1">
                 <a:latin typeface="Consolas" panose="020B0609020204030204" pitchFamily="49" charset="0"/>
+                <a:hlinkClick r:id="rId23"/>
               </a:rPr>
               <a:t>cummin</a:t>
             </a:r>
@@ -20483,6 +20913,7 @@
             <a:r>
               <a:rPr lang="en-US" sz="1200" b="1" dirty="0" err="1">
                 <a:latin typeface="Consolas" panose="020B0609020204030204" pitchFamily="49" charset="0"/>
+                <a:hlinkClick r:id="rId24"/>
               </a:rPr>
               <a:t>cumprod</a:t>
             </a:r>
@@ -22541,7 +22972,14 @@
               <a:rPr lang="en-US" sz="1200" b="1" dirty="0" err="1">
                 <a:latin typeface="Consolas" panose="020B0609020204030204" pitchFamily="49" charset="0"/>
               </a:rPr>
-              <a:t>pd.merge</a:t>
+              <a:t>pd.</a:t>
+            </a:r>
+            <a:r>
+              <a:rPr lang="en-US" sz="1200" b="1" dirty="0" err="1">
+                <a:latin typeface="Consolas" panose="020B0609020204030204" pitchFamily="49" charset="0"/>
+                <a:hlinkClick r:id="rId25"/>
+              </a:rPr>
+              <a:t>merge</a:t>
             </a:r>
             <a:r>
               <a:rPr lang="en-US" sz="1200" b="1" dirty="0">
@@ -22620,7 +23058,14 @@
               <a:rPr lang="en-US" sz="1200" b="1" dirty="0" err="1">
                 <a:latin typeface="Consolas" panose="020B0609020204030204" pitchFamily="49" charset="0"/>
               </a:rPr>
-              <a:t>pd.merge</a:t>
+              <a:t>pd.</a:t>
+            </a:r>
+            <a:r>
+              <a:rPr lang="en-US" sz="1200" b="1" dirty="0" err="1">
+                <a:latin typeface="Consolas" panose="020B0609020204030204" pitchFamily="49" charset="0"/>
+                <a:hlinkClick r:id="rId25"/>
+              </a:rPr>
+              <a:t>merge</a:t>
             </a:r>
             <a:r>
               <a:rPr lang="en-US" sz="1200" b="1" dirty="0">
@@ -22695,7 +23140,14 @@
               <a:rPr lang="en-US" sz="1200" b="1" dirty="0" err="1">
                 <a:latin typeface="Consolas" panose="020B0609020204030204" pitchFamily="49" charset="0"/>
               </a:rPr>
-              <a:t>pd.merge</a:t>
+              <a:t>pd.</a:t>
+            </a:r>
+            <a:r>
+              <a:rPr lang="en-US" sz="1200" b="1" dirty="0" err="1">
+                <a:latin typeface="Consolas" panose="020B0609020204030204" pitchFamily="49" charset="0"/>
+                <a:hlinkClick r:id="rId25"/>
+              </a:rPr>
+              <a:t>merge</a:t>
             </a:r>
             <a:r>
               <a:rPr lang="en-US" sz="1200" b="1" dirty="0">
@@ -22751,7 +23203,14 @@
               <a:rPr lang="en-US" sz="1200" b="1" dirty="0" err="1">
                 <a:latin typeface="Consolas" panose="020B0609020204030204" pitchFamily="49" charset="0"/>
               </a:rPr>
-              <a:t>pd.merge</a:t>
+              <a:t>pd.</a:t>
+            </a:r>
+            <a:r>
+              <a:rPr lang="en-US" sz="1200" b="1" dirty="0" err="1">
+                <a:latin typeface="Consolas" panose="020B0609020204030204" pitchFamily="49" charset="0"/>
+                <a:hlinkClick r:id="rId25"/>
+              </a:rPr>
+              <a:t>merge</a:t>
             </a:r>
             <a:r>
               <a:rPr lang="en-US" sz="1200" b="1" dirty="0">
@@ -23223,7 +23682,20 @@
               <a:rPr lang="en-US" sz="1200" b="1" dirty="0">
                 <a:latin typeface="Consolas" panose="020B0609020204030204" pitchFamily="49" charset="0"/>
               </a:rPr>
-              <a:t>[adf.x1.isin(bdf.x1)]</a:t>
+              <a:t>[adf.x1.</a:t>
+            </a:r>
+            <a:r>
+              <a:rPr lang="en-US" sz="1200" b="1" dirty="0">
+                <a:latin typeface="Consolas" panose="020B0609020204030204" pitchFamily="49" charset="0"/>
+                <a:hlinkClick r:id="rId26"/>
+              </a:rPr>
+              <a:t>isin</a:t>
+            </a:r>
+            <a:r>
+              <a:rPr lang="en-US" sz="1200" b="1" dirty="0">
+                <a:latin typeface="Consolas" panose="020B0609020204030204" pitchFamily="49" charset="0"/>
+              </a:rPr>
+              <a:t>(bdf.x1)]</a:t>
             </a:r>
           </a:p>
           <a:p>
@@ -23270,7 +23742,20 @@
               <a:rPr lang="en-US" sz="1200" b="1" dirty="0">
                 <a:latin typeface="Consolas" panose="020B0609020204030204" pitchFamily="49" charset="0"/>
               </a:rPr>
-              <a:t>[~adf.x1.isin(bdf.x1)]</a:t>
+              <a:t>[~adf.x1.</a:t>
+            </a:r>
+            <a:r>
+              <a:rPr lang="en-US" sz="1200" b="1" dirty="0">
+                <a:latin typeface="Consolas" panose="020B0609020204030204" pitchFamily="49" charset="0"/>
+                <a:hlinkClick r:id="rId26"/>
+              </a:rPr>
+              <a:t>isin</a:t>
+            </a:r>
+            <a:r>
+              <a:rPr lang="en-US" sz="1200" b="1" dirty="0">
+                <a:latin typeface="Consolas" panose="020B0609020204030204" pitchFamily="49" charset="0"/>
+              </a:rPr>
+              <a:t>(bdf.x1)]</a:t>
             </a:r>
           </a:p>
           <a:p>
@@ -24692,7 +25177,14 @@
               <a:rPr lang="en-US" sz="1200" b="1" dirty="0" err="1">
                 <a:latin typeface="Consolas" panose="020B0609020204030204" pitchFamily="49" charset="0"/>
               </a:rPr>
-              <a:t>pd.merge</a:t>
+              <a:t>pd.</a:t>
+            </a:r>
+            <a:r>
+              <a:rPr lang="en-US" sz="1200" b="1" dirty="0" err="1">
+                <a:latin typeface="Consolas" panose="020B0609020204030204" pitchFamily="49" charset="0"/>
+                <a:hlinkClick r:id="rId25"/>
+              </a:rPr>
+              <a:t>merge</a:t>
             </a:r>
             <a:r>
               <a:rPr lang="en-US" sz="1200" b="1" dirty="0">
@@ -24761,7 +25253,14 @@
               <a:rPr lang="en-US" sz="1200" b="1" dirty="0" err="1">
                 <a:latin typeface="Consolas" panose="020B0609020204030204" pitchFamily="49" charset="0"/>
               </a:rPr>
-              <a:t>pd.merge</a:t>
+              <a:t>pd.</a:t>
+            </a:r>
+            <a:r>
+              <a:rPr lang="en-US" sz="1200" b="1" dirty="0" err="1">
+                <a:latin typeface="Consolas" panose="020B0609020204030204" pitchFamily="49" charset="0"/>
+                <a:hlinkClick r:id="rId25"/>
+              </a:rPr>
+              <a:t>merge</a:t>
             </a:r>
             <a:r>
               <a:rPr lang="en-US" sz="1200" b="1" dirty="0">
@@ -24829,7 +25328,14 @@
               <a:rPr lang="en-US" sz="1200" b="1" dirty="0" err="1">
                 <a:latin typeface="Consolas" panose="020B0609020204030204" pitchFamily="49" charset="0"/>
               </a:rPr>
-              <a:t>pd.merge</a:t>
+              <a:t>pd.</a:t>
+            </a:r>
+            <a:r>
+              <a:rPr lang="en-US" sz="1200" b="1" dirty="0" err="1">
+                <a:latin typeface="Consolas" panose="020B0609020204030204" pitchFamily="49" charset="0"/>
+                <a:hlinkClick r:id="rId25"/>
+              </a:rPr>
+              <a:t>merge</a:t>
             </a:r>
             <a:r>
               <a:rPr lang="en-US" sz="1200" b="1" dirty="0">
@@ -24875,7 +25381,20 @@
               <a:rPr lang="en-US" sz="1200" b="1" dirty="0">
                 <a:latin typeface="Consolas" panose="020B0609020204030204" pitchFamily="49" charset="0"/>
               </a:rPr>
-              <a:t>.query('_merge == "</a:t>
+              <a:t>.</a:t>
+            </a:r>
+            <a:r>
+              <a:rPr lang="en-US" sz="1200" b="1" dirty="0">
+                <a:latin typeface="Consolas" panose="020B0609020204030204" pitchFamily="49" charset="0"/>
+                <a:hlinkClick r:id="rId27"/>
+              </a:rPr>
+              <a:t>query</a:t>
+            </a:r>
+            <a:r>
+              <a:rPr lang="en-US" sz="1200" b="1" dirty="0">
+                <a:latin typeface="Consolas" panose="020B0609020204030204" pitchFamily="49" charset="0"/>
+              </a:rPr>
+              <a:t>('_merge == "</a:t>
             </a:r>
             <a:r>
               <a:rPr lang="en-US" sz="1200" b="1" dirty="0" err="1">
@@ -24895,7 +25414,20 @@
               <a:rPr lang="en-US" sz="1200" b="1" dirty="0">
                 <a:latin typeface="Consolas" panose="020B0609020204030204" pitchFamily="49" charset="0"/>
               </a:rPr>
-              <a:t>.drop(columns=['_merge'])</a:t>
+              <a:t>.</a:t>
+            </a:r>
+            <a:r>
+              <a:rPr lang="en-US" sz="1200" b="1" dirty="0">
+                <a:latin typeface="Consolas" panose="020B0609020204030204" pitchFamily="49" charset="0"/>
+                <a:hlinkClick r:id="rId28"/>
+              </a:rPr>
+              <a:t>drop</a:t>
+            </a:r>
+            <a:r>
+              <a:rPr lang="en-US" sz="1200" b="1" dirty="0">
+                <a:latin typeface="Consolas" panose="020B0609020204030204" pitchFamily="49" charset="0"/>
+              </a:rPr>
+              <a:t>(columns=['_merge'])</a:t>
             </a:r>
           </a:p>
           <a:p>
@@ -24968,10 +25500,25 @@
           <a:p>
             <a:pPr algn="ctr"/>
             <a:r>
-              <a:rPr lang="en-US" sz="2800" b="1" dirty="0"/>
+              <a:rPr lang="en-US" sz="2800" b="1" dirty="0">
+                <a:solidFill>
+                  <a:schemeClr val="bg1"/>
+                </a:solidFill>
+                <a:hlinkClick r:id="rId29">
+                  <a:extLst>
+                    <a:ext uri="{A12FA001-AC4F-418D-AE19-62706E023703}">
+                      <ahyp:hlinkClr xmlns:ahyp="http://schemas.microsoft.com/office/drawing/2018/hyperlinkcolor" val="tx"/>
+                    </a:ext>
+                  </a:extLst>
+                </a:hlinkClick>
+              </a:rPr>
               <a:t>Group Data</a:t>
             </a:r>
-            <a:endParaRPr lang="en-US" sz="2683" dirty="0"/>
+            <a:endParaRPr lang="en-US" sz="2683" dirty="0">
+              <a:solidFill>
+                <a:schemeClr val="bg1"/>
+              </a:solidFill>
+            </a:endParaRPr>
           </a:p>
         </p:txBody>
       </p:sp>
@@ -25857,7 +26404,14 @@
               <a:rPr lang="en-US" sz="1200" b="1" dirty="0" err="1">
                 <a:latin typeface="Consolas" panose="020B0609020204030204" pitchFamily="49" charset="0"/>
               </a:rPr>
-              <a:t>df.groupby</a:t>
+              <a:t>df.</a:t>
+            </a:r>
+            <a:r>
+              <a:rPr lang="en-US" sz="1200" b="1" dirty="0" err="1">
+                <a:latin typeface="Consolas" panose="020B0609020204030204" pitchFamily="49" charset="0"/>
+                <a:hlinkClick r:id="rId30"/>
+              </a:rPr>
+              <a:t>groupby</a:t>
             </a:r>
             <a:r>
               <a:rPr lang="en-US" sz="1200" b="1" dirty="0">
@@ -25891,7 +26445,14 @@
               <a:rPr lang="en-US" sz="1200" b="1" dirty="0" err="1">
                 <a:latin typeface="Consolas" panose="020B0609020204030204" pitchFamily="49" charset="0"/>
               </a:rPr>
-              <a:t>df.groupby</a:t>
+              <a:t>df.</a:t>
+            </a:r>
+            <a:r>
+              <a:rPr lang="en-US" sz="1200" b="1" dirty="0" err="1">
+                <a:latin typeface="Consolas" panose="020B0609020204030204" pitchFamily="49" charset="0"/>
+                <a:hlinkClick r:id="rId30"/>
+              </a:rPr>
+              <a:t>groupby</a:t>
             </a:r>
             <a:r>
               <a:rPr lang="en-US" sz="1200" b="1" dirty="0">
@@ -25999,8 +26560,15 @@
             <a:r>
               <a:rPr lang="en-US" sz="1200" b="1" dirty="0">
                 <a:latin typeface="Consolas" panose="020B0609020204030204" pitchFamily="49" charset="0"/>
-              </a:rPr>
-              <a:t>max(axis=1)</a:t>
+                <a:hlinkClick r:id="rId13"/>
+              </a:rPr>
+              <a:t>max</a:t>
+            </a:r>
+            <a:r>
+              <a:rPr lang="en-US" sz="1200" b="1" dirty="0">
+                <a:latin typeface="Consolas" panose="020B0609020204030204" pitchFamily="49" charset="0"/>
+              </a:rPr>
+              <a:t>(axis=1)</a:t>
             </a:r>
           </a:p>
           <a:p>
@@ -26014,8 +26582,15 @@
             <a:r>
               <a:rPr lang="en-US" sz="1200" b="1" dirty="0">
                 <a:latin typeface="Consolas" panose="020B0609020204030204" pitchFamily="49" charset="0"/>
-              </a:rPr>
-              <a:t>clip(lower=-10,upper=10)</a:t>
+                <a:hlinkClick r:id="rId31"/>
+              </a:rPr>
+              <a:t>clip</a:t>
+            </a:r>
+            <a:r>
+              <a:rPr lang="en-US" sz="1200" b="1" dirty="0">
+                <a:latin typeface="Consolas" panose="020B0609020204030204" pitchFamily="49" charset="0"/>
+              </a:rPr>
+              <a:t>(lower=-10,upper=10)</a:t>
             </a:r>
           </a:p>
           <a:p>
@@ -26052,8 +26627,15 @@
             <a:r>
               <a:rPr lang="en-US" sz="1200" b="1" dirty="0">
                 <a:latin typeface="Consolas" panose="020B0609020204030204" pitchFamily="49" charset="0"/>
-              </a:rPr>
-              <a:t>min(axis=1)</a:t>
+                <a:hlinkClick r:id="rId12"/>
+              </a:rPr>
+              <a:t>min</a:t>
+            </a:r>
+            <a:r>
+              <a:rPr lang="en-US" sz="1200" b="1" dirty="0">
+                <a:latin typeface="Consolas" panose="020B0609020204030204" pitchFamily="49" charset="0"/>
+              </a:rPr>
+              <a:t>(axis=1)</a:t>
             </a:r>
           </a:p>
           <a:p>
@@ -26067,8 +26649,15 @@
             <a:r>
               <a:rPr lang="en-US" sz="1200" b="1" dirty="0">
                 <a:latin typeface="Consolas" panose="020B0609020204030204" pitchFamily="49" charset="0"/>
-              </a:rPr>
-              <a:t>abs()</a:t>
+                <a:hlinkClick r:id="rId32"/>
+              </a:rPr>
+              <a:t>abs</a:t>
+            </a:r>
+            <a:r>
+              <a:rPr lang="en-US" sz="1200" b="1" dirty="0">
+                <a:latin typeface="Consolas" panose="020B0609020204030204" pitchFamily="49" charset="0"/>
+              </a:rPr>
+              <a:t>()</a:t>
             </a:r>
           </a:p>
           <a:p>
@@ -26154,10 +26743,25 @@
           <a:p>
             <a:pPr algn="ctr"/>
             <a:r>
-              <a:rPr lang="en-US" sz="2800" b="1" dirty="0"/>
+              <a:rPr lang="en-US" sz="2800" b="1" dirty="0">
+                <a:solidFill>
+                  <a:schemeClr val="bg1"/>
+                </a:solidFill>
+                <a:hlinkClick r:id="rId33">
+                  <a:extLst>
+                    <a:ext uri="{A12FA001-AC4F-418D-AE19-62706E023703}">
+                      <ahyp:hlinkClr xmlns:ahyp="http://schemas.microsoft.com/office/drawing/2018/hyperlinkcolor" val="tx"/>
+                    </a:ext>
+                  </a:extLst>
+                </a:hlinkClick>
+              </a:rPr>
               <a:t>Windows</a:t>
             </a:r>
-            <a:endParaRPr lang="en-US" sz="2683" dirty="0"/>
+            <a:endParaRPr lang="en-US" sz="2683" dirty="0">
+              <a:solidFill>
+                <a:schemeClr val="bg1"/>
+              </a:solidFill>
+            </a:endParaRPr>
           </a:p>
         </p:txBody>
       </p:sp>
@@ -26187,7 +26791,14 @@
               <a:rPr lang="en-US" sz="1200" b="1" dirty="0" err="1">
                 <a:latin typeface="Consolas" panose="020B0609020204030204" pitchFamily="49" charset="0"/>
               </a:rPr>
-              <a:t>df.expanding</a:t>
+              <a:t>df.</a:t>
+            </a:r>
+            <a:r>
+              <a:rPr lang="en-US" sz="1200" b="1" dirty="0" err="1">
+                <a:latin typeface="Consolas" panose="020B0609020204030204" pitchFamily="49" charset="0"/>
+                <a:hlinkClick r:id="rId34"/>
+              </a:rPr>
+              <a:t>expanding</a:t>
             </a:r>
             <a:r>
               <a:rPr lang="en-US" sz="1200" b="1" dirty="0">
@@ -26211,7 +26822,14 @@
               <a:rPr lang="en-US" sz="1200" b="1" dirty="0" err="1">
                 <a:latin typeface="Consolas" panose="020B0609020204030204" pitchFamily="49" charset="0"/>
               </a:rPr>
-              <a:t>df.rolling</a:t>
+              <a:t>df.</a:t>
+            </a:r>
+            <a:r>
+              <a:rPr lang="en-US" sz="1200" b="1" dirty="0" err="1">
+                <a:latin typeface="Consolas" panose="020B0609020204030204" pitchFamily="49" charset="0"/>
+                <a:hlinkClick r:id="rId35"/>
+              </a:rPr>
+              <a:t>rolling</a:t>
             </a:r>
             <a:r>
               <a:rPr lang="en-US" sz="1200" b="1" dirty="0">
@@ -26254,8 +26872,15 @@
             <a:r>
               <a:rPr lang="en-US" sz="1200" b="1" dirty="0">
                 <a:latin typeface="Consolas" panose="020B0609020204030204" pitchFamily="49" charset="0"/>
-              </a:rPr>
-              <a:t>size()</a:t>
+                <a:hlinkClick r:id="rId36"/>
+              </a:rPr>
+              <a:t>size</a:t>
+            </a:r>
+            <a:r>
+              <a:rPr lang="en-US" sz="1200" b="1" dirty="0">
+                <a:latin typeface="Consolas" panose="020B0609020204030204" pitchFamily="49" charset="0"/>
+              </a:rPr>
+              <a:t>()</a:t>
             </a:r>
           </a:p>
           <a:p>
@@ -26292,6 +26917,7 @@
             <a:r>
               <a:rPr lang="en-US" sz="1200" b="1" dirty="0" err="1">
                 <a:latin typeface="Consolas" panose="020B0609020204030204" pitchFamily="49" charset="0"/>
+                <a:hlinkClick r:id="rId37"/>
               </a:rPr>
               <a:t>agg</a:t>
             </a:r>
@@ -26393,7 +27019,14 @@
               <a:rPr lang="en-US" sz="1200" b="1" dirty="0" err="1">
                 <a:latin typeface="Consolas" panose="020B0609020204030204" pitchFamily="49" charset="0"/>
               </a:rPr>
-              <a:t>df.dropna</a:t>
+              <a:t>df.</a:t>
+            </a:r>
+            <a:r>
+              <a:rPr lang="en-US" sz="1200" b="1" dirty="0" err="1">
+                <a:latin typeface="Consolas" panose="020B0609020204030204" pitchFamily="49" charset="0"/>
+                <a:hlinkClick r:id="rId38"/>
+              </a:rPr>
+              <a:t>dropna</a:t>
             </a:r>
             <a:r>
               <a:rPr lang="en-US" sz="1200" b="1" dirty="0">
@@ -26413,7 +27046,14 @@
               <a:rPr lang="en-US" sz="1200" b="1" dirty="0" err="1">
                 <a:latin typeface="Consolas" panose="020B0609020204030204" pitchFamily="49" charset="0"/>
               </a:rPr>
-              <a:t>df.fillna</a:t>
+              <a:t>df.</a:t>
+            </a:r>
+            <a:r>
+              <a:rPr lang="en-US" sz="1200" b="1" dirty="0" err="1">
+                <a:latin typeface="Consolas" panose="020B0609020204030204" pitchFamily="49" charset="0"/>
+                <a:hlinkClick r:id="rId39"/>
+              </a:rPr>
+              <a:t>fillna</a:t>
             </a:r>
             <a:r>
               <a:rPr lang="en-US" sz="1200" b="1" dirty="0">
@@ -26468,10 +27108,25 @@
           <a:p>
             <a:pPr algn="ctr"/>
             <a:r>
-              <a:rPr lang="en-US" sz="2800" b="1" dirty="0"/>
+              <a:rPr lang="en-US" sz="2800" b="1" dirty="0">
+                <a:solidFill>
+                  <a:schemeClr val="bg1"/>
+                </a:solidFill>
+                <a:hlinkClick r:id="rId40">
+                  <a:extLst>
+                    <a:ext uri="{A12FA001-AC4F-418D-AE19-62706E023703}">
+                      <ahyp:hlinkClr xmlns:ahyp="http://schemas.microsoft.com/office/drawing/2018/hyperlinkcolor" val="tx"/>
+                    </a:ext>
+                  </a:extLst>
+                </a:hlinkClick>
+              </a:rPr>
               <a:t>Plotting</a:t>
             </a:r>
-            <a:endParaRPr lang="en-US" sz="2683" dirty="0"/>
+            <a:endParaRPr lang="en-US" sz="2683" dirty="0">
+              <a:solidFill>
+                <a:schemeClr val="bg1"/>
+              </a:solidFill>
+            </a:endParaRPr>
           </a:p>
         </p:txBody>
       </p:sp>
@@ -26501,7 +27156,20 @@
               <a:rPr lang="en-US" sz="1200" b="1" dirty="0" err="1">
                 <a:latin typeface="Consolas" panose="020B0609020204030204" pitchFamily="49" charset="0"/>
               </a:rPr>
-              <a:t>df.plot.hist</a:t>
+              <a:t>df.</a:t>
+            </a:r>
+            <a:r>
+              <a:rPr lang="en-US" sz="1200" b="1" dirty="0" err="1">
+                <a:latin typeface="Consolas" panose="020B0609020204030204" pitchFamily="49" charset="0"/>
+                <a:hlinkClick r:id="rId41"/>
+              </a:rPr>
+              <a:t>plot</a:t>
+            </a:r>
+            <a:r>
+              <a:rPr lang="en-US" sz="1200" b="1" dirty="0" err="1">
+                <a:latin typeface="Consolas" panose="020B0609020204030204" pitchFamily="49" charset="0"/>
+              </a:rPr>
+              <a:t>.hist</a:t>
             </a:r>
             <a:r>
               <a:rPr lang="en-US" sz="1200" b="1" dirty="0">
@@ -26545,7 +27213,20 @@
               <a:rPr lang="en-US" sz="1200" b="1" dirty="0" err="1">
                 <a:latin typeface="Consolas" panose="020B0609020204030204" pitchFamily="49" charset="0"/>
               </a:rPr>
-              <a:t>df.plot.scatter</a:t>
+              <a:t>df.</a:t>
+            </a:r>
+            <a:r>
+              <a:rPr lang="en-US" sz="1200" b="1" dirty="0" err="1">
+                <a:latin typeface="Consolas" panose="020B0609020204030204" pitchFamily="49" charset="0"/>
+                <a:hlinkClick r:id="rId41"/>
+              </a:rPr>
+              <a:t>plot</a:t>
+            </a:r>
+            <a:r>
+              <a:rPr lang="en-US" sz="1200" b="1" dirty="0" err="1">
+                <a:latin typeface="Consolas" panose="020B0609020204030204" pitchFamily="49" charset="0"/>
+              </a:rPr>
+              <a:t>.scatter</a:t>
             </a:r>
             <a:r>
               <a:rPr lang="en-US" sz="1200" b="1" dirty="0">
@@ -26584,7 +27265,7 @@
           <p:nvPr/>
         </p:nvPicPr>
         <p:blipFill>
-          <a:blip r:embed="rId2"/>
+          <a:blip r:embed="rId42"/>
           <a:stretch>
             <a:fillRect/>
           </a:stretch>
@@ -26608,7 +27289,7 @@
           <p:nvPr/>
         </p:nvPicPr>
         <p:blipFill>
-          <a:blip r:embed="rId3"/>
+          <a:blip r:embed="rId43"/>
           <a:stretch>
             <a:fillRect/>
           </a:stretch>
@@ -26677,7 +27358,7 @@
           <a:p>
             <a:r>
               <a:rPr lang="en-US" sz="800" dirty="0">
-                <a:hlinkClick r:id="rId4"/>
+                <a:hlinkClick r:id="rId44"/>
               </a:rPr>
               <a:t>http://pandas.pydata.org/</a:t>
             </a:r>
@@ -26703,7 +27384,7 @@
             </a:r>
             <a:r>
               <a:rPr lang="en-US" sz="800" dirty="0">
-                <a:hlinkClick r:id="rId5"/>
+                <a:hlinkClick r:id="rId45"/>
               </a:rPr>
               <a:t>https://www.rstudio.com/wp-content/uploads/2015/02/data-wrangling-cheatsheet.pdf</a:t>
             </a:r>
@@ -26713,7 +27394,7 @@
             </a:r>
             <a:r>
               <a:rPr lang="en-US" sz="800" dirty="0">
-                <a:hlinkClick r:id="rId6"/>
+                <a:hlinkClick r:id="rId46"/>
               </a:rPr>
               <a:t>Princeton Consultants</a:t>
             </a:r>

</xml_diff>